<commit_message>
recoding virtctl & virtlet, support run in daemon and support logs
</commit_message>
<xml_diff>
--- a/docs/design/kubevirt_executor_design.pptx
+++ b/docs/design/kubevirt_executor_design.pptx
@@ -197,7 +197,7 @@
           <a:p>
             <a:fld id="{B706F0AF-853F-47DF-82A5-B567E07A739C}" type="datetimeFigureOut">
               <a:rPr lang="zh-CN" altLang="en-US" smtClean="0"/>
-              <a:t>2019/6/25</a:t>
+              <a:t>2019/7/4</a:t>
             </a:fld>
             <a:endParaRPr lang="zh-CN" altLang="en-US"/>
           </a:p>
@@ -695,7 +695,7 @@
           <a:p>
             <a:fld id="{67B6AFFA-113A-4A5C-A210-059A98D6B693}" type="datetimeFigureOut">
               <a:rPr lang="zh-CN" altLang="en-US" smtClean="0"/>
-              <a:t>2019/6/25</a:t>
+              <a:t>2019/7/4</a:t>
             </a:fld>
             <a:endParaRPr lang="zh-CN" altLang="en-US"/>
           </a:p>
@@ -893,7 +893,7 @@
           <a:p>
             <a:fld id="{67B6AFFA-113A-4A5C-A210-059A98D6B693}" type="datetimeFigureOut">
               <a:rPr lang="zh-CN" altLang="en-US" smtClean="0"/>
-              <a:t>2019/6/25</a:t>
+              <a:t>2019/7/4</a:t>
             </a:fld>
             <a:endParaRPr lang="zh-CN" altLang="en-US"/>
           </a:p>
@@ -1101,7 +1101,7 @@
           <a:p>
             <a:fld id="{67B6AFFA-113A-4A5C-A210-059A98D6B693}" type="datetimeFigureOut">
               <a:rPr lang="zh-CN" altLang="en-US" smtClean="0"/>
-              <a:t>2019/6/25</a:t>
+              <a:t>2019/7/4</a:t>
             </a:fld>
             <a:endParaRPr lang="zh-CN" altLang="en-US"/>
           </a:p>
@@ -1299,7 +1299,7 @@
           <a:p>
             <a:fld id="{67B6AFFA-113A-4A5C-A210-059A98D6B693}" type="datetimeFigureOut">
               <a:rPr lang="zh-CN" altLang="en-US" smtClean="0"/>
-              <a:t>2019/6/25</a:t>
+              <a:t>2019/7/4</a:t>
             </a:fld>
             <a:endParaRPr lang="zh-CN" altLang="en-US"/>
           </a:p>
@@ -1574,7 +1574,7 @@
           <a:p>
             <a:fld id="{67B6AFFA-113A-4A5C-A210-059A98D6B693}" type="datetimeFigureOut">
               <a:rPr lang="zh-CN" altLang="en-US" smtClean="0"/>
-              <a:t>2019/6/25</a:t>
+              <a:t>2019/7/4</a:t>
             </a:fld>
             <a:endParaRPr lang="zh-CN" altLang="en-US"/>
           </a:p>
@@ -1839,7 +1839,7 @@
           <a:p>
             <a:fld id="{67B6AFFA-113A-4A5C-A210-059A98D6B693}" type="datetimeFigureOut">
               <a:rPr lang="zh-CN" altLang="en-US" smtClean="0"/>
-              <a:t>2019/6/25</a:t>
+              <a:t>2019/7/4</a:t>
             </a:fld>
             <a:endParaRPr lang="zh-CN" altLang="en-US"/>
           </a:p>
@@ -2251,7 +2251,7 @@
           <a:p>
             <a:fld id="{67B6AFFA-113A-4A5C-A210-059A98D6B693}" type="datetimeFigureOut">
               <a:rPr lang="zh-CN" altLang="en-US" smtClean="0"/>
-              <a:t>2019/6/25</a:t>
+              <a:t>2019/7/4</a:t>
             </a:fld>
             <a:endParaRPr lang="zh-CN" altLang="en-US"/>
           </a:p>
@@ -2392,7 +2392,7 @@
           <a:p>
             <a:fld id="{67B6AFFA-113A-4A5C-A210-059A98D6B693}" type="datetimeFigureOut">
               <a:rPr lang="zh-CN" altLang="en-US" smtClean="0"/>
-              <a:t>2019/6/25</a:t>
+              <a:t>2019/7/4</a:t>
             </a:fld>
             <a:endParaRPr lang="zh-CN" altLang="en-US"/>
           </a:p>
@@ -2505,7 +2505,7 @@
           <a:p>
             <a:fld id="{67B6AFFA-113A-4A5C-A210-059A98D6B693}" type="datetimeFigureOut">
               <a:rPr lang="zh-CN" altLang="en-US" smtClean="0"/>
-              <a:t>2019/6/25</a:t>
+              <a:t>2019/7/4</a:t>
             </a:fld>
             <a:endParaRPr lang="zh-CN" altLang="en-US"/>
           </a:p>
@@ -2816,7 +2816,7 @@
           <a:p>
             <a:fld id="{67B6AFFA-113A-4A5C-A210-059A98D6B693}" type="datetimeFigureOut">
               <a:rPr lang="zh-CN" altLang="en-US" smtClean="0"/>
-              <a:t>2019/6/25</a:t>
+              <a:t>2019/7/4</a:t>
             </a:fld>
             <a:endParaRPr lang="zh-CN" altLang="en-US"/>
           </a:p>
@@ -3104,7 +3104,7 @@
           <a:p>
             <a:fld id="{67B6AFFA-113A-4A5C-A210-059A98D6B693}" type="datetimeFigureOut">
               <a:rPr lang="zh-CN" altLang="en-US" smtClean="0"/>
-              <a:t>2019/6/25</a:t>
+              <a:t>2019/7/4</a:t>
             </a:fld>
             <a:endParaRPr lang="zh-CN" altLang="en-US"/>
           </a:p>
@@ -3345,7 +3345,7 @@
           <a:p>
             <a:fld id="{67B6AFFA-113A-4A5C-A210-059A98D6B693}" type="datetimeFigureOut">
               <a:rPr lang="zh-CN" altLang="en-US" smtClean="0"/>
-              <a:t>2019/6/25</a:t>
+              <a:t>2019/7/4</a:t>
             </a:fld>
             <a:endParaRPr lang="zh-CN" altLang="en-US"/>
           </a:p>
@@ -6582,7 +6582,7 @@
                 <a:latin typeface="Times New Roman" panose="02020603050405020304" pitchFamily="18" charset="0"/>
                 <a:cs typeface="Times New Roman" panose="02020603050405020304" pitchFamily="18" charset="0"/>
               </a:rPr>
-              <a:t>VM Watcher</a:t>
+              <a:t>VM Cycler</a:t>
             </a:r>
             <a:endParaRPr lang="zh-CN" altLang="en-US" sz="2000" dirty="0">
               <a:solidFill>
@@ -7014,7 +7014,7 @@
                 <a:latin typeface="Times New Roman" panose="02020603050405020304" pitchFamily="18" charset="0"/>
                 <a:cs typeface="Times New Roman" panose="02020603050405020304" pitchFamily="18" charset="0"/>
               </a:rPr>
-              <a:t>Host Watcher</a:t>
+              <a:t>Host Cycler</a:t>
             </a:r>
             <a:endParaRPr lang="zh-CN" altLang="en-US" sz="2000" dirty="0">
               <a:solidFill>

</xml_diff>

<commit_message>
update executor to v0.1
</commit_message>
<xml_diff>
--- a/docs/design/kubevirt_executor_design.pptx
+++ b/docs/design/kubevirt_executor_design.pptx
@@ -197,7 +197,7 @@
           <a:p>
             <a:fld id="{B706F0AF-853F-47DF-82A5-B567E07A739C}" type="datetimeFigureOut">
               <a:rPr lang="zh-CN" altLang="en-US" smtClean="0"/>
-              <a:t>2019/7/4</a:t>
+              <a:t>2019/7/5</a:t>
             </a:fld>
             <a:endParaRPr lang="zh-CN" altLang="en-US"/>
           </a:p>
@@ -695,7 +695,7 @@
           <a:p>
             <a:fld id="{67B6AFFA-113A-4A5C-A210-059A98D6B693}" type="datetimeFigureOut">
               <a:rPr lang="zh-CN" altLang="en-US" smtClean="0"/>
-              <a:t>2019/7/4</a:t>
+              <a:t>2019/7/5</a:t>
             </a:fld>
             <a:endParaRPr lang="zh-CN" altLang="en-US"/>
           </a:p>
@@ -893,7 +893,7 @@
           <a:p>
             <a:fld id="{67B6AFFA-113A-4A5C-A210-059A98D6B693}" type="datetimeFigureOut">
               <a:rPr lang="zh-CN" altLang="en-US" smtClean="0"/>
-              <a:t>2019/7/4</a:t>
+              <a:t>2019/7/5</a:t>
             </a:fld>
             <a:endParaRPr lang="zh-CN" altLang="en-US"/>
           </a:p>
@@ -1101,7 +1101,7 @@
           <a:p>
             <a:fld id="{67B6AFFA-113A-4A5C-A210-059A98D6B693}" type="datetimeFigureOut">
               <a:rPr lang="zh-CN" altLang="en-US" smtClean="0"/>
-              <a:t>2019/7/4</a:t>
+              <a:t>2019/7/5</a:t>
             </a:fld>
             <a:endParaRPr lang="zh-CN" altLang="en-US"/>
           </a:p>
@@ -1299,7 +1299,7 @@
           <a:p>
             <a:fld id="{67B6AFFA-113A-4A5C-A210-059A98D6B693}" type="datetimeFigureOut">
               <a:rPr lang="zh-CN" altLang="en-US" smtClean="0"/>
-              <a:t>2019/7/4</a:t>
+              <a:t>2019/7/5</a:t>
             </a:fld>
             <a:endParaRPr lang="zh-CN" altLang="en-US"/>
           </a:p>
@@ -1574,7 +1574,7 @@
           <a:p>
             <a:fld id="{67B6AFFA-113A-4A5C-A210-059A98D6B693}" type="datetimeFigureOut">
               <a:rPr lang="zh-CN" altLang="en-US" smtClean="0"/>
-              <a:t>2019/7/4</a:t>
+              <a:t>2019/7/5</a:t>
             </a:fld>
             <a:endParaRPr lang="zh-CN" altLang="en-US"/>
           </a:p>
@@ -1839,7 +1839,7 @@
           <a:p>
             <a:fld id="{67B6AFFA-113A-4A5C-A210-059A98D6B693}" type="datetimeFigureOut">
               <a:rPr lang="zh-CN" altLang="en-US" smtClean="0"/>
-              <a:t>2019/7/4</a:t>
+              <a:t>2019/7/5</a:t>
             </a:fld>
             <a:endParaRPr lang="zh-CN" altLang="en-US"/>
           </a:p>
@@ -2251,7 +2251,7 @@
           <a:p>
             <a:fld id="{67B6AFFA-113A-4A5C-A210-059A98D6B693}" type="datetimeFigureOut">
               <a:rPr lang="zh-CN" altLang="en-US" smtClean="0"/>
-              <a:t>2019/7/4</a:t>
+              <a:t>2019/7/5</a:t>
             </a:fld>
             <a:endParaRPr lang="zh-CN" altLang="en-US"/>
           </a:p>
@@ -2392,7 +2392,7 @@
           <a:p>
             <a:fld id="{67B6AFFA-113A-4A5C-A210-059A98D6B693}" type="datetimeFigureOut">
               <a:rPr lang="zh-CN" altLang="en-US" smtClean="0"/>
-              <a:t>2019/7/4</a:t>
+              <a:t>2019/7/5</a:t>
             </a:fld>
             <a:endParaRPr lang="zh-CN" altLang="en-US"/>
           </a:p>
@@ -2505,7 +2505,7 @@
           <a:p>
             <a:fld id="{67B6AFFA-113A-4A5C-A210-059A98D6B693}" type="datetimeFigureOut">
               <a:rPr lang="zh-CN" altLang="en-US" smtClean="0"/>
-              <a:t>2019/7/4</a:t>
+              <a:t>2019/7/5</a:t>
             </a:fld>
             <a:endParaRPr lang="zh-CN" altLang="en-US"/>
           </a:p>
@@ -2816,7 +2816,7 @@
           <a:p>
             <a:fld id="{67B6AFFA-113A-4A5C-A210-059A98D6B693}" type="datetimeFigureOut">
               <a:rPr lang="zh-CN" altLang="en-US" smtClean="0"/>
-              <a:t>2019/7/4</a:t>
+              <a:t>2019/7/5</a:t>
             </a:fld>
             <a:endParaRPr lang="zh-CN" altLang="en-US"/>
           </a:p>
@@ -3104,7 +3104,7 @@
           <a:p>
             <a:fld id="{67B6AFFA-113A-4A5C-A210-059A98D6B693}" type="datetimeFigureOut">
               <a:rPr lang="zh-CN" altLang="en-US" smtClean="0"/>
-              <a:t>2019/7/4</a:t>
+              <a:t>2019/7/5</a:t>
             </a:fld>
             <a:endParaRPr lang="zh-CN" altLang="en-US"/>
           </a:p>
@@ -3345,7 +3345,7 @@
           <a:p>
             <a:fld id="{67B6AFFA-113A-4A5C-A210-059A98D6B693}" type="datetimeFigureOut">
               <a:rPr lang="zh-CN" altLang="en-US" smtClean="0"/>
-              <a:t>2019/7/4</a:t>
+              <a:t>2019/7/5</a:t>
             </a:fld>
             <a:endParaRPr lang="zh-CN" altLang="en-US"/>
           </a:p>
@@ -6030,10 +6030,10 @@
       </p:sp>
       <p:sp>
         <p:nvSpPr>
-          <p:cNvPr id="142" name="箭头: 左弧形 141">
-            <a:extLst>
-              <a:ext uri="{FF2B5EF4-FFF2-40B4-BE49-F238E27FC236}">
-                <a16:creationId xmlns:a16="http://schemas.microsoft.com/office/drawing/2014/main" id="{A0D4B23C-B82B-4D4C-AA31-230AEE065992}"/>
+          <p:cNvPr id="144" name="箭头: 左弧形 143">
+            <a:extLst>
+              <a:ext uri="{FF2B5EF4-FFF2-40B4-BE49-F238E27FC236}">
+                <a16:creationId xmlns:a16="http://schemas.microsoft.com/office/drawing/2014/main" id="{9AE91237-84CE-4D56-928A-57EC745875FB}"/>
               </a:ext>
             </a:extLst>
           </p:cNvPr>
@@ -6042,7 +6042,7 @@
         </p:nvSpPr>
         <p:spPr>
           <a:xfrm>
-            <a:off x="6854110" y="5366557"/>
+            <a:off x="9866008" y="5521911"/>
             <a:ext cx="468573" cy="590091"/>
           </a:xfrm>
           <a:prstGeom prst="curvedRightArrow">
@@ -6102,10 +6102,10 @@
       </p:sp>
       <p:sp>
         <p:nvSpPr>
-          <p:cNvPr id="143" name="箭头: 左弧形 142">
-            <a:extLst>
-              <a:ext uri="{FF2B5EF4-FFF2-40B4-BE49-F238E27FC236}">
-                <a16:creationId xmlns:a16="http://schemas.microsoft.com/office/drawing/2014/main" id="{5B8A808E-FE39-43FA-B577-29CDC8A81E1F}"/>
+          <p:cNvPr id="145" name="箭头: 左弧形 144">
+            <a:extLst>
+              <a:ext uri="{FF2B5EF4-FFF2-40B4-BE49-F238E27FC236}">
+                <a16:creationId xmlns:a16="http://schemas.microsoft.com/office/drawing/2014/main" id="{E53FB1B6-BCA7-428E-80F6-5DC9C350F33E}"/>
               </a:ext>
             </a:extLst>
           </p:cNvPr>
@@ -6114,7 +6114,7 @@
         </p:nvSpPr>
         <p:spPr>
           <a:xfrm rot="10800000">
-            <a:off x="7393194" y="5366557"/>
+            <a:off x="10405092" y="5521911"/>
             <a:ext cx="468573" cy="590091"/>
           </a:xfrm>
           <a:prstGeom prst="curvedRightArrow">
@@ -6174,10 +6174,10 @@
       </p:sp>
       <p:sp>
         <p:nvSpPr>
-          <p:cNvPr id="144" name="箭头: 左弧形 143">
-            <a:extLst>
-              <a:ext uri="{FF2B5EF4-FFF2-40B4-BE49-F238E27FC236}">
-                <a16:creationId xmlns:a16="http://schemas.microsoft.com/office/drawing/2014/main" id="{9AE91237-84CE-4D56-928A-57EC745875FB}"/>
+          <p:cNvPr id="148" name="矩形 147">
+            <a:extLst>
+              <a:ext uri="{FF2B5EF4-FFF2-40B4-BE49-F238E27FC236}">
+                <a16:creationId xmlns:a16="http://schemas.microsoft.com/office/drawing/2014/main" id="{B24A2483-AE17-4B55-8C1B-DFC8CC6BA8D0}"/>
               </a:ext>
             </a:extLst>
           </p:cNvPr>
@@ -6186,10 +6186,1444 @@
         </p:nvSpPr>
         <p:spPr>
           <a:xfrm>
-            <a:off x="9866008" y="5521911"/>
-            <a:ext cx="468573" cy="590091"/>
-          </a:xfrm>
-          <a:prstGeom prst="curvedRightArrow">
+            <a:off x="10769940" y="5654544"/>
+            <a:ext cx="814115" cy="317381"/>
+          </a:xfrm>
+          <a:prstGeom prst="rect">
+            <a:avLst/>
+          </a:prstGeom>
+          <a:solidFill>
+            <a:schemeClr val="bg1"/>
+          </a:solidFill>
+          <a:ln>
+            <a:solidFill>
+              <a:schemeClr val="tx1"/>
+            </a:solidFill>
+          </a:ln>
+        </p:spPr>
+        <p:style>
+          <a:lnRef idx="2">
+            <a:schemeClr val="accent1">
+              <a:shade val="50000"/>
+            </a:schemeClr>
+          </a:lnRef>
+          <a:fillRef idx="1">
+            <a:schemeClr val="accent1"/>
+          </a:fillRef>
+          <a:effectRef idx="0">
+            <a:schemeClr val="accent1"/>
+          </a:effectRef>
+          <a:fontRef idx="minor">
+            <a:schemeClr val="lt1"/>
+          </a:fontRef>
+        </p:style>
+        <p:txBody>
+          <a:bodyPr rtlCol="0" anchor="ctr"/>
+          <a:lstStyle/>
+          <a:p>
+            <a:pPr algn="ctr"/>
+            <a:endParaRPr lang="zh-CN" altLang="en-US"/>
+          </a:p>
+        </p:txBody>
+      </p:sp>
+      <p:sp>
+        <p:nvSpPr>
+          <p:cNvPr id="149" name="文本框 148">
+            <a:extLst>
+              <a:ext uri="{FF2B5EF4-FFF2-40B4-BE49-F238E27FC236}">
+                <a16:creationId xmlns:a16="http://schemas.microsoft.com/office/drawing/2014/main" id="{007D7452-A6CA-4892-A596-FDFF4ED98821}"/>
+              </a:ext>
+            </a:extLst>
+          </p:cNvPr>
+          <p:cNvSpPr txBox="1"/>
+          <p:nvPr/>
+        </p:nvSpPr>
+        <p:spPr>
+          <a:xfrm>
+            <a:off x="10629072" y="5620888"/>
+            <a:ext cx="1098932" cy="369332"/>
+          </a:xfrm>
+          <a:prstGeom prst="rect">
+            <a:avLst/>
+          </a:prstGeom>
+          <a:noFill/>
+        </p:spPr>
+        <p:txBody>
+          <a:bodyPr wrap="square" rtlCol="0">
+            <a:spAutoFit/>
+          </a:bodyPr>
+          <a:lstStyle/>
+          <a:p>
+            <a:pPr algn="ctr"/>
+            <a:r>
+              <a:rPr lang="en-US" altLang="zh-CN" dirty="0">
+                <a:solidFill>
+                  <a:schemeClr val="accent2"/>
+                </a:solidFill>
+                <a:latin typeface="Times New Roman" panose="02020603050405020304" pitchFamily="18" charset="0"/>
+                <a:cs typeface="Times New Roman" panose="02020603050405020304" pitchFamily="18" charset="0"/>
+              </a:rPr>
+              <a:t>Cyclic </a:t>
+            </a:r>
+            <a:endParaRPr lang="zh-CN" altLang="en-US" dirty="0">
+              <a:solidFill>
+                <a:schemeClr val="accent2"/>
+              </a:solidFill>
+              <a:latin typeface="Times New Roman" panose="02020603050405020304" pitchFamily="18" charset="0"/>
+              <a:cs typeface="Times New Roman" panose="02020603050405020304" pitchFamily="18" charset="0"/>
+            </a:endParaRPr>
+          </a:p>
+        </p:txBody>
+      </p:sp>
+      <p:sp>
+        <p:nvSpPr>
+          <p:cNvPr id="150" name="矩形: 圆角 149">
+            <a:extLst>
+              <a:ext uri="{FF2B5EF4-FFF2-40B4-BE49-F238E27FC236}">
+                <a16:creationId xmlns:a16="http://schemas.microsoft.com/office/drawing/2014/main" id="{B3858B09-7AF0-4D53-9E9F-E0F9750CBF20}"/>
+              </a:ext>
+            </a:extLst>
+          </p:cNvPr>
+          <p:cNvSpPr/>
+          <p:nvPr/>
+        </p:nvSpPr>
+        <p:spPr>
+          <a:xfrm>
+            <a:off x="6477702" y="4026845"/>
+            <a:ext cx="1722700" cy="568765"/>
+          </a:xfrm>
+          <a:prstGeom prst="roundRect">
+            <a:avLst/>
+          </a:prstGeom>
+          <a:solidFill>
+            <a:schemeClr val="bg1">
+              <a:lumMod val="85000"/>
+            </a:schemeClr>
+          </a:solidFill>
+          <a:ln>
+            <a:solidFill>
+              <a:schemeClr val="tx1"/>
+            </a:solidFill>
+          </a:ln>
+        </p:spPr>
+        <p:style>
+          <a:lnRef idx="2">
+            <a:schemeClr val="accent1">
+              <a:shade val="50000"/>
+            </a:schemeClr>
+          </a:lnRef>
+          <a:fillRef idx="1">
+            <a:schemeClr val="accent1"/>
+          </a:fillRef>
+          <a:effectRef idx="0">
+            <a:schemeClr val="accent1"/>
+          </a:effectRef>
+          <a:fontRef idx="minor">
+            <a:schemeClr val="lt1"/>
+          </a:fontRef>
+        </p:style>
+        <p:txBody>
+          <a:bodyPr rtlCol="0" anchor="ctr"/>
+          <a:lstStyle/>
+          <a:p>
+            <a:pPr algn="ctr"/>
+            <a:r>
+              <a:rPr lang="en-US" altLang="zh-CN" sz="2000" dirty="0">
+                <a:solidFill>
+                  <a:schemeClr val="tx1"/>
+                </a:solidFill>
+                <a:latin typeface="Times New Roman" panose="02020603050405020304" pitchFamily="18" charset="0"/>
+                <a:cs typeface="Times New Roman" panose="02020603050405020304" pitchFamily="18" charset="0"/>
+              </a:rPr>
+              <a:t>Event Handler</a:t>
+            </a:r>
+            <a:endParaRPr lang="zh-CN" altLang="en-US" sz="2000" dirty="0">
+              <a:solidFill>
+                <a:schemeClr val="tx1"/>
+              </a:solidFill>
+              <a:latin typeface="Times New Roman" panose="02020603050405020304" pitchFamily="18" charset="0"/>
+              <a:cs typeface="Times New Roman" panose="02020603050405020304" pitchFamily="18" charset="0"/>
+            </a:endParaRPr>
+          </a:p>
+        </p:txBody>
+      </p:sp>
+      <p:cxnSp>
+        <p:nvCxnSpPr>
+          <p:cNvPr id="151" name="直接连接符 150">
+            <a:extLst>
+              <a:ext uri="{FF2B5EF4-FFF2-40B4-BE49-F238E27FC236}">
+                <a16:creationId xmlns:a16="http://schemas.microsoft.com/office/drawing/2014/main" id="{B370BCE5-2599-495B-831D-0BA96F44A311}"/>
+              </a:ext>
+            </a:extLst>
+          </p:cNvPr>
+          <p:cNvCxnSpPr>
+            <a:cxnSpLocks/>
+          </p:cNvCxnSpPr>
+          <p:nvPr/>
+        </p:nvCxnSpPr>
+        <p:spPr>
+          <a:xfrm>
+            <a:off x="7379218" y="2135040"/>
+            <a:ext cx="0" cy="867734"/>
+          </a:xfrm>
+          <a:prstGeom prst="line">
+            <a:avLst/>
+          </a:prstGeom>
+          <a:ln w="28575">
+            <a:solidFill>
+              <a:schemeClr val="tx1"/>
+            </a:solidFill>
+            <a:prstDash val="sysDot"/>
+            <a:headEnd type="none" w="med" len="med"/>
+            <a:tailEnd type="none" w="med" len="med"/>
+          </a:ln>
+        </p:spPr>
+        <p:style>
+          <a:lnRef idx="1">
+            <a:schemeClr val="accent1"/>
+          </a:lnRef>
+          <a:fillRef idx="0">
+            <a:schemeClr val="accent1"/>
+          </a:fillRef>
+          <a:effectRef idx="0">
+            <a:schemeClr val="accent1"/>
+          </a:effectRef>
+          <a:fontRef idx="minor">
+            <a:schemeClr val="tx1"/>
+          </a:fontRef>
+        </p:style>
+      </p:cxnSp>
+      <p:sp>
+        <p:nvSpPr>
+          <p:cNvPr id="153" name="箭头: V 形 152">
+            <a:extLst>
+              <a:ext uri="{FF2B5EF4-FFF2-40B4-BE49-F238E27FC236}">
+                <a16:creationId xmlns:a16="http://schemas.microsoft.com/office/drawing/2014/main" id="{91EC59F4-D4A2-4985-8674-350C773A7D71}"/>
+              </a:ext>
+            </a:extLst>
+          </p:cNvPr>
+          <p:cNvSpPr/>
+          <p:nvPr/>
+        </p:nvSpPr>
+        <p:spPr>
+          <a:xfrm rot="16200000">
+            <a:off x="7293382" y="2123077"/>
+            <a:ext cx="171671" cy="162365"/>
+          </a:xfrm>
+          <a:prstGeom prst="chevron">
+            <a:avLst/>
+          </a:prstGeom>
+          <a:solidFill>
+            <a:schemeClr val="bg1">
+              <a:lumMod val="85000"/>
+            </a:schemeClr>
+          </a:solidFill>
+          <a:ln>
+            <a:solidFill>
+              <a:schemeClr val="tx1"/>
+            </a:solidFill>
+          </a:ln>
+        </p:spPr>
+        <p:style>
+          <a:lnRef idx="2">
+            <a:schemeClr val="accent1">
+              <a:shade val="50000"/>
+            </a:schemeClr>
+          </a:lnRef>
+          <a:fillRef idx="1">
+            <a:schemeClr val="accent1"/>
+          </a:fillRef>
+          <a:effectRef idx="0">
+            <a:schemeClr val="accent1"/>
+          </a:effectRef>
+          <a:fontRef idx="minor">
+            <a:schemeClr val="lt1"/>
+          </a:fontRef>
+        </p:style>
+        <p:txBody>
+          <a:bodyPr rot="0" spcFirstLastPara="0" vertOverflow="overflow" horzOverflow="overflow" vert="horz" wrap="square" lIns="91440" tIns="45720" rIns="91440" bIns="45720" numCol="1" spcCol="0" rtlCol="0" fromWordArt="0" anchor="ctr" anchorCtr="0" forceAA="0" compatLnSpc="1">
+            <a:prstTxWarp prst="textNoShape">
+              <a:avLst/>
+            </a:prstTxWarp>
+            <a:noAutofit/>
+          </a:bodyPr>
+          <a:lstStyle/>
+          <a:p>
+            <a:pPr algn="ctr"/>
+            <a:endParaRPr lang="zh-CN" altLang="en-US" sz="2000">
+              <a:solidFill>
+                <a:schemeClr val="tx1"/>
+              </a:solidFill>
+              <a:latin typeface="Times New Roman" panose="02020603050405020304" pitchFamily="18" charset="0"/>
+              <a:cs typeface="Times New Roman" panose="02020603050405020304" pitchFamily="18" charset="0"/>
+            </a:endParaRPr>
+          </a:p>
+        </p:txBody>
+      </p:sp>
+      <p:sp>
+        <p:nvSpPr>
+          <p:cNvPr id="154" name="箭头: V 形 153">
+            <a:extLst>
+              <a:ext uri="{FF2B5EF4-FFF2-40B4-BE49-F238E27FC236}">
+                <a16:creationId xmlns:a16="http://schemas.microsoft.com/office/drawing/2014/main" id="{0FDA09D3-EAD3-43AF-8C4F-3254B3D38C45}"/>
+              </a:ext>
+            </a:extLst>
+          </p:cNvPr>
+          <p:cNvSpPr/>
+          <p:nvPr/>
+        </p:nvSpPr>
+        <p:spPr>
+          <a:xfrm rot="5400000">
+            <a:off x="7294391" y="2900408"/>
+            <a:ext cx="171671" cy="162365"/>
+          </a:xfrm>
+          <a:prstGeom prst="chevron">
+            <a:avLst/>
+          </a:prstGeom>
+          <a:solidFill>
+            <a:schemeClr val="bg1">
+              <a:lumMod val="85000"/>
+            </a:schemeClr>
+          </a:solidFill>
+          <a:ln>
+            <a:solidFill>
+              <a:schemeClr val="tx1"/>
+            </a:solidFill>
+          </a:ln>
+        </p:spPr>
+        <p:style>
+          <a:lnRef idx="2">
+            <a:schemeClr val="accent1">
+              <a:shade val="50000"/>
+            </a:schemeClr>
+          </a:lnRef>
+          <a:fillRef idx="1">
+            <a:schemeClr val="accent1"/>
+          </a:fillRef>
+          <a:effectRef idx="0">
+            <a:schemeClr val="accent1"/>
+          </a:effectRef>
+          <a:fontRef idx="minor">
+            <a:schemeClr val="lt1"/>
+          </a:fontRef>
+        </p:style>
+        <p:txBody>
+          <a:bodyPr rot="0" spcFirstLastPara="0" vertOverflow="overflow" horzOverflow="overflow" vert="horz" wrap="square" lIns="91440" tIns="45720" rIns="91440" bIns="45720" numCol="1" spcCol="0" rtlCol="0" fromWordArt="0" anchor="ctr" anchorCtr="0" forceAA="0" compatLnSpc="1">
+            <a:prstTxWarp prst="textNoShape">
+              <a:avLst/>
+            </a:prstTxWarp>
+            <a:noAutofit/>
+          </a:bodyPr>
+          <a:lstStyle/>
+          <a:p>
+            <a:pPr algn="ctr"/>
+            <a:endParaRPr lang="zh-CN" altLang="en-US" sz="2000">
+              <a:solidFill>
+                <a:schemeClr val="tx1"/>
+              </a:solidFill>
+              <a:latin typeface="Times New Roman" panose="02020603050405020304" pitchFamily="18" charset="0"/>
+              <a:cs typeface="Times New Roman" panose="02020603050405020304" pitchFamily="18" charset="0"/>
+            </a:endParaRPr>
+          </a:p>
+        </p:txBody>
+      </p:sp>
+      <p:sp>
+        <p:nvSpPr>
+          <p:cNvPr id="155" name="箭头: V 形 154">
+            <a:extLst>
+              <a:ext uri="{FF2B5EF4-FFF2-40B4-BE49-F238E27FC236}">
+                <a16:creationId xmlns:a16="http://schemas.microsoft.com/office/drawing/2014/main" id="{63B53B7F-F1AF-475F-82A0-936E2924F53D}"/>
+              </a:ext>
+            </a:extLst>
+          </p:cNvPr>
+          <p:cNvSpPr/>
+          <p:nvPr/>
+        </p:nvSpPr>
+        <p:spPr>
+          <a:xfrm rot="5400000">
+            <a:off x="2063906" y="2885977"/>
+            <a:ext cx="171671" cy="162365"/>
+          </a:xfrm>
+          <a:prstGeom prst="chevron">
+            <a:avLst/>
+          </a:prstGeom>
+          <a:solidFill>
+            <a:schemeClr val="bg1">
+              <a:lumMod val="85000"/>
+            </a:schemeClr>
+          </a:solidFill>
+          <a:ln>
+            <a:solidFill>
+              <a:schemeClr val="tx1"/>
+            </a:solidFill>
+          </a:ln>
+        </p:spPr>
+        <p:style>
+          <a:lnRef idx="2">
+            <a:schemeClr val="accent1">
+              <a:shade val="50000"/>
+            </a:schemeClr>
+          </a:lnRef>
+          <a:fillRef idx="1">
+            <a:schemeClr val="accent1"/>
+          </a:fillRef>
+          <a:effectRef idx="0">
+            <a:schemeClr val="accent1"/>
+          </a:effectRef>
+          <a:fontRef idx="minor">
+            <a:schemeClr val="lt1"/>
+          </a:fontRef>
+        </p:style>
+        <p:txBody>
+          <a:bodyPr rot="0" spcFirstLastPara="0" vertOverflow="overflow" horzOverflow="overflow" vert="horz" wrap="square" lIns="91440" tIns="45720" rIns="91440" bIns="45720" numCol="1" spcCol="0" rtlCol="0" fromWordArt="0" anchor="ctr" anchorCtr="0" forceAA="0" compatLnSpc="1">
+            <a:prstTxWarp prst="textNoShape">
+              <a:avLst/>
+            </a:prstTxWarp>
+            <a:noAutofit/>
+          </a:bodyPr>
+          <a:lstStyle/>
+          <a:p>
+            <a:pPr algn="ctr"/>
+            <a:endParaRPr lang="zh-CN" altLang="en-US" sz="2000">
+              <a:solidFill>
+                <a:schemeClr val="tx1"/>
+              </a:solidFill>
+              <a:latin typeface="Times New Roman" panose="02020603050405020304" pitchFamily="18" charset="0"/>
+              <a:cs typeface="Times New Roman" panose="02020603050405020304" pitchFamily="18" charset="0"/>
+            </a:endParaRPr>
+          </a:p>
+        </p:txBody>
+      </p:sp>
+      <p:sp>
+        <p:nvSpPr>
+          <p:cNvPr id="157" name="箭头: V 形 156">
+            <a:extLst>
+              <a:ext uri="{FF2B5EF4-FFF2-40B4-BE49-F238E27FC236}">
+                <a16:creationId xmlns:a16="http://schemas.microsoft.com/office/drawing/2014/main" id="{90AF2F6E-E7CC-4D58-96D0-7E75EDC4BBDA}"/>
+              </a:ext>
+            </a:extLst>
+          </p:cNvPr>
+          <p:cNvSpPr/>
+          <p:nvPr/>
+        </p:nvSpPr>
+        <p:spPr>
+          <a:xfrm rot="16200000">
+            <a:off x="2063905" y="2109782"/>
+            <a:ext cx="171671" cy="162365"/>
+          </a:xfrm>
+          <a:prstGeom prst="chevron">
+            <a:avLst/>
+          </a:prstGeom>
+          <a:solidFill>
+            <a:schemeClr val="bg1">
+              <a:lumMod val="85000"/>
+            </a:schemeClr>
+          </a:solidFill>
+          <a:ln>
+            <a:solidFill>
+              <a:schemeClr val="tx1"/>
+            </a:solidFill>
+          </a:ln>
+        </p:spPr>
+        <p:style>
+          <a:lnRef idx="2">
+            <a:schemeClr val="accent1">
+              <a:shade val="50000"/>
+            </a:schemeClr>
+          </a:lnRef>
+          <a:fillRef idx="1">
+            <a:schemeClr val="accent1"/>
+          </a:fillRef>
+          <a:effectRef idx="0">
+            <a:schemeClr val="accent1"/>
+          </a:effectRef>
+          <a:fontRef idx="minor">
+            <a:schemeClr val="lt1"/>
+          </a:fontRef>
+        </p:style>
+        <p:txBody>
+          <a:bodyPr rot="0" spcFirstLastPara="0" vertOverflow="overflow" horzOverflow="overflow" vert="horz" wrap="square" lIns="91440" tIns="45720" rIns="91440" bIns="45720" numCol="1" spcCol="0" rtlCol="0" fromWordArt="0" anchor="ctr" anchorCtr="0" forceAA="0" compatLnSpc="1">
+            <a:prstTxWarp prst="textNoShape">
+              <a:avLst/>
+            </a:prstTxWarp>
+            <a:noAutofit/>
+          </a:bodyPr>
+          <a:lstStyle/>
+          <a:p>
+            <a:pPr algn="ctr"/>
+            <a:endParaRPr lang="zh-CN" altLang="en-US" sz="2000">
+              <a:solidFill>
+                <a:schemeClr val="tx1"/>
+              </a:solidFill>
+              <a:latin typeface="Times New Roman" panose="02020603050405020304" pitchFamily="18" charset="0"/>
+              <a:cs typeface="Times New Roman" panose="02020603050405020304" pitchFamily="18" charset="0"/>
+            </a:endParaRPr>
+          </a:p>
+        </p:txBody>
+      </p:sp>
+      <p:cxnSp>
+        <p:nvCxnSpPr>
+          <p:cNvPr id="158" name="直接连接符 157">
+            <a:extLst>
+              <a:ext uri="{FF2B5EF4-FFF2-40B4-BE49-F238E27FC236}">
+                <a16:creationId xmlns:a16="http://schemas.microsoft.com/office/drawing/2014/main" id="{890D5C19-B165-4610-B61E-15555CAEC7B8}"/>
+              </a:ext>
+            </a:extLst>
+          </p:cNvPr>
+          <p:cNvCxnSpPr>
+            <a:cxnSpLocks/>
+          </p:cNvCxnSpPr>
+          <p:nvPr/>
+        </p:nvCxnSpPr>
+        <p:spPr>
+          <a:xfrm flipV="1">
+            <a:off x="7393193" y="4600877"/>
+            <a:ext cx="0" cy="313510"/>
+          </a:xfrm>
+          <a:prstGeom prst="line">
+            <a:avLst/>
+          </a:prstGeom>
+          <a:ln w="19050">
+            <a:solidFill>
+              <a:schemeClr val="tx1"/>
+            </a:solidFill>
+            <a:prstDash val="solid"/>
+            <a:headEnd type="arrow" w="med" len="med"/>
+            <a:tailEnd type="arrow" w="med" len="med"/>
+          </a:ln>
+        </p:spPr>
+        <p:style>
+          <a:lnRef idx="1">
+            <a:schemeClr val="accent1"/>
+          </a:lnRef>
+          <a:fillRef idx="0">
+            <a:schemeClr val="accent1"/>
+          </a:fillRef>
+          <a:effectRef idx="0">
+            <a:schemeClr val="accent1"/>
+          </a:effectRef>
+          <a:fontRef idx="minor">
+            <a:schemeClr val="tx1"/>
+          </a:fontRef>
+        </p:style>
+      </p:cxnSp>
+      <p:sp>
+        <p:nvSpPr>
+          <p:cNvPr id="159" name="矩形: 圆角 158">
+            <a:extLst>
+              <a:ext uri="{FF2B5EF4-FFF2-40B4-BE49-F238E27FC236}">
+                <a16:creationId xmlns:a16="http://schemas.microsoft.com/office/drawing/2014/main" id="{AA616D19-5FCD-4D6E-84D9-CCA09D7B969B}"/>
+              </a:ext>
+            </a:extLst>
+          </p:cNvPr>
+          <p:cNvSpPr/>
+          <p:nvPr/>
+        </p:nvSpPr>
+        <p:spPr>
+          <a:xfrm>
+            <a:off x="9522633" y="4025943"/>
+            <a:ext cx="1642368" cy="568765"/>
+          </a:xfrm>
+          <a:prstGeom prst="roundRect">
+            <a:avLst/>
+          </a:prstGeom>
+          <a:solidFill>
+            <a:schemeClr val="bg1">
+              <a:lumMod val="85000"/>
+            </a:schemeClr>
+          </a:solidFill>
+          <a:ln>
+            <a:solidFill>
+              <a:schemeClr val="tx1"/>
+            </a:solidFill>
+          </a:ln>
+        </p:spPr>
+        <p:style>
+          <a:lnRef idx="2">
+            <a:schemeClr val="accent1">
+              <a:shade val="50000"/>
+            </a:schemeClr>
+          </a:lnRef>
+          <a:fillRef idx="1">
+            <a:schemeClr val="accent1"/>
+          </a:fillRef>
+          <a:effectRef idx="0">
+            <a:schemeClr val="accent1"/>
+          </a:effectRef>
+          <a:fontRef idx="minor">
+            <a:schemeClr val="lt1"/>
+          </a:fontRef>
+        </p:style>
+        <p:txBody>
+          <a:bodyPr rtlCol="0" anchor="ctr"/>
+          <a:lstStyle/>
+          <a:p>
+            <a:pPr algn="ctr"/>
+            <a:r>
+              <a:rPr lang="en-US" altLang="zh-CN" sz="2000" dirty="0">
+                <a:solidFill>
+                  <a:schemeClr val="tx1"/>
+                </a:solidFill>
+                <a:latin typeface="Times New Roman" panose="02020603050405020304" pitchFamily="18" charset="0"/>
+                <a:cs typeface="Times New Roman" panose="02020603050405020304" pitchFamily="18" charset="0"/>
+              </a:rPr>
+              <a:t>Host Cycler</a:t>
+            </a:r>
+            <a:endParaRPr lang="zh-CN" altLang="en-US" sz="2000" dirty="0">
+              <a:solidFill>
+                <a:schemeClr val="tx1"/>
+              </a:solidFill>
+              <a:latin typeface="Times New Roman" panose="02020603050405020304" pitchFamily="18" charset="0"/>
+              <a:cs typeface="Times New Roman" panose="02020603050405020304" pitchFamily="18" charset="0"/>
+            </a:endParaRPr>
+          </a:p>
+        </p:txBody>
+      </p:sp>
+      <p:cxnSp>
+        <p:nvCxnSpPr>
+          <p:cNvPr id="160" name="直接连接符 159">
+            <a:extLst>
+              <a:ext uri="{FF2B5EF4-FFF2-40B4-BE49-F238E27FC236}">
+                <a16:creationId xmlns:a16="http://schemas.microsoft.com/office/drawing/2014/main" id="{7FAEE5DC-989F-4270-BCC4-48F6F7026190}"/>
+              </a:ext>
+            </a:extLst>
+          </p:cNvPr>
+          <p:cNvCxnSpPr>
+            <a:cxnSpLocks/>
+            <a:stCxn id="135" idx="0"/>
+            <a:endCxn id="159" idx="2"/>
+          </p:cNvCxnSpPr>
+          <p:nvPr/>
+        </p:nvCxnSpPr>
+        <p:spPr>
+          <a:xfrm flipV="1">
+            <a:off x="10339929" y="4594708"/>
+            <a:ext cx="3888" cy="296978"/>
+          </a:xfrm>
+          <a:prstGeom prst="line">
+            <a:avLst/>
+          </a:prstGeom>
+          <a:ln w="19050">
+            <a:solidFill>
+              <a:schemeClr val="tx1"/>
+            </a:solidFill>
+            <a:prstDash val="solid"/>
+            <a:headEnd type="arrow" w="med" len="med"/>
+            <a:tailEnd type="arrow" w="med" len="med"/>
+          </a:ln>
+        </p:spPr>
+        <p:style>
+          <a:lnRef idx="1">
+            <a:schemeClr val="accent1"/>
+          </a:lnRef>
+          <a:fillRef idx="0">
+            <a:schemeClr val="accent1"/>
+          </a:fillRef>
+          <a:effectRef idx="0">
+            <a:schemeClr val="accent1"/>
+          </a:effectRef>
+          <a:fontRef idx="minor">
+            <a:schemeClr val="tx1"/>
+          </a:fontRef>
+        </p:style>
+      </p:cxnSp>
+      <p:sp>
+        <p:nvSpPr>
+          <p:cNvPr id="163" name="矩形: 圆角 162">
+            <a:extLst>
+              <a:ext uri="{FF2B5EF4-FFF2-40B4-BE49-F238E27FC236}">
+                <a16:creationId xmlns:a16="http://schemas.microsoft.com/office/drawing/2014/main" id="{D24DC065-C1EE-48E5-9536-0BF6233DC14A}"/>
+              </a:ext>
+            </a:extLst>
+          </p:cNvPr>
+          <p:cNvSpPr/>
+          <p:nvPr/>
+        </p:nvSpPr>
+        <p:spPr>
+          <a:xfrm>
+            <a:off x="9513397" y="2981590"/>
+            <a:ext cx="1642368" cy="568765"/>
+          </a:xfrm>
+          <a:prstGeom prst="roundRect">
+            <a:avLst/>
+          </a:prstGeom>
+          <a:solidFill>
+            <a:schemeClr val="bg1">
+              <a:lumMod val="85000"/>
+            </a:schemeClr>
+          </a:solidFill>
+          <a:ln>
+            <a:solidFill>
+              <a:schemeClr val="tx1"/>
+            </a:solidFill>
+          </a:ln>
+        </p:spPr>
+        <p:style>
+          <a:lnRef idx="2">
+            <a:schemeClr val="accent1">
+              <a:shade val="50000"/>
+            </a:schemeClr>
+          </a:lnRef>
+          <a:fillRef idx="1">
+            <a:schemeClr val="accent1"/>
+          </a:fillRef>
+          <a:effectRef idx="0">
+            <a:schemeClr val="accent1"/>
+          </a:effectRef>
+          <a:fontRef idx="minor">
+            <a:schemeClr val="lt1"/>
+          </a:fontRef>
+        </p:style>
+        <p:txBody>
+          <a:bodyPr rtlCol="0" anchor="ctr"/>
+          <a:lstStyle/>
+          <a:p>
+            <a:pPr algn="ctr"/>
+            <a:r>
+              <a:rPr lang="en-US" altLang="zh-CN" sz="2000" dirty="0">
+                <a:solidFill>
+                  <a:schemeClr val="tx1"/>
+                </a:solidFill>
+                <a:latin typeface="Times New Roman" panose="02020603050405020304" pitchFamily="18" charset="0"/>
+                <a:cs typeface="Times New Roman" panose="02020603050405020304" pitchFamily="18" charset="0"/>
+              </a:rPr>
+              <a:t>Daemon</a:t>
+            </a:r>
+            <a:endParaRPr lang="zh-CN" altLang="en-US" sz="2000" dirty="0">
+              <a:solidFill>
+                <a:schemeClr val="tx1"/>
+              </a:solidFill>
+              <a:latin typeface="Times New Roman" panose="02020603050405020304" pitchFamily="18" charset="0"/>
+              <a:cs typeface="Times New Roman" panose="02020603050405020304" pitchFamily="18" charset="0"/>
+            </a:endParaRPr>
+          </a:p>
+        </p:txBody>
+      </p:sp>
+      <p:cxnSp>
+        <p:nvCxnSpPr>
+          <p:cNvPr id="164" name="直接连接符 163">
+            <a:extLst>
+              <a:ext uri="{FF2B5EF4-FFF2-40B4-BE49-F238E27FC236}">
+                <a16:creationId xmlns:a16="http://schemas.microsoft.com/office/drawing/2014/main" id="{D8F3194E-6187-4EE0-B121-60848A84A5CE}"/>
+              </a:ext>
+            </a:extLst>
+          </p:cNvPr>
+          <p:cNvCxnSpPr>
+            <a:cxnSpLocks/>
+            <a:stCxn id="159" idx="1"/>
+            <a:endCxn id="150" idx="3"/>
+          </p:cNvCxnSpPr>
+          <p:nvPr/>
+        </p:nvCxnSpPr>
+        <p:spPr>
+          <a:xfrm flipH="1">
+            <a:off x="8200402" y="4310326"/>
+            <a:ext cx="1322231" cy="902"/>
+          </a:xfrm>
+          <a:prstGeom prst="line">
+            <a:avLst/>
+          </a:prstGeom>
+          <a:ln w="19050">
+            <a:solidFill>
+              <a:schemeClr val="tx1"/>
+            </a:solidFill>
+            <a:prstDash val="solid"/>
+            <a:headEnd type="none" w="med" len="med"/>
+            <a:tailEnd type="none" w="med" len="med"/>
+          </a:ln>
+        </p:spPr>
+        <p:style>
+          <a:lnRef idx="1">
+            <a:schemeClr val="accent1"/>
+          </a:lnRef>
+          <a:fillRef idx="0">
+            <a:schemeClr val="accent1"/>
+          </a:fillRef>
+          <a:effectRef idx="0">
+            <a:schemeClr val="accent1"/>
+          </a:effectRef>
+          <a:fontRef idx="minor">
+            <a:schemeClr val="tx1"/>
+          </a:fontRef>
+        </p:style>
+      </p:cxnSp>
+      <p:cxnSp>
+        <p:nvCxnSpPr>
+          <p:cNvPr id="168" name="连接符: 肘形 167">
+            <a:extLst>
+              <a:ext uri="{FF2B5EF4-FFF2-40B4-BE49-F238E27FC236}">
+                <a16:creationId xmlns:a16="http://schemas.microsoft.com/office/drawing/2014/main" id="{488A72D3-C1D0-49BC-A7BD-E12910D2562D}"/>
+              </a:ext>
+            </a:extLst>
+          </p:cNvPr>
+          <p:cNvCxnSpPr>
+            <a:cxnSpLocks/>
+            <a:stCxn id="170" idx="0"/>
+            <a:endCxn id="163" idx="2"/>
+          </p:cNvCxnSpPr>
+          <p:nvPr/>
+        </p:nvCxnSpPr>
+        <p:spPr>
+          <a:xfrm rot="5400000" flipH="1" flipV="1">
+            <a:off x="9215022" y="3197007"/>
+            <a:ext cx="766210" cy="1472907"/>
+          </a:xfrm>
+          <a:prstGeom prst="bentConnector3">
+            <a:avLst>
+              <a:gd name="adj1" fmla="val 57233"/>
+            </a:avLst>
+          </a:prstGeom>
+          <a:ln w="19050">
+            <a:solidFill>
+              <a:schemeClr val="tx1"/>
+            </a:solidFill>
+            <a:prstDash val="solid"/>
+            <a:headEnd type="none" w="med" len="med"/>
+            <a:tailEnd type="arrow" w="med" len="med"/>
+          </a:ln>
+        </p:spPr>
+        <p:style>
+          <a:lnRef idx="1">
+            <a:schemeClr val="accent1"/>
+          </a:lnRef>
+          <a:fillRef idx="0">
+            <a:schemeClr val="accent1"/>
+          </a:fillRef>
+          <a:effectRef idx="0">
+            <a:schemeClr val="accent1"/>
+          </a:effectRef>
+          <a:fontRef idx="minor">
+            <a:schemeClr val="tx1"/>
+          </a:fontRef>
+        </p:style>
+      </p:cxnSp>
+      <p:sp>
+        <p:nvSpPr>
+          <p:cNvPr id="170" name="等腰三角形 169">
+            <a:extLst>
+              <a:ext uri="{FF2B5EF4-FFF2-40B4-BE49-F238E27FC236}">
+                <a16:creationId xmlns:a16="http://schemas.microsoft.com/office/drawing/2014/main" id="{0AFAB4CD-1C9B-4292-8F4B-8249ECB8DF96}"/>
+              </a:ext>
+            </a:extLst>
+          </p:cNvPr>
+          <p:cNvSpPr/>
+          <p:nvPr/>
+        </p:nvSpPr>
+        <p:spPr>
+          <a:xfrm>
+            <a:off x="8730377" y="4316565"/>
+            <a:ext cx="262593" cy="296978"/>
+          </a:xfrm>
+          <a:prstGeom prst="triangle">
+            <a:avLst/>
+          </a:prstGeom>
+          <a:noFill/>
+          <a:ln>
+            <a:noFill/>
+          </a:ln>
+        </p:spPr>
+        <p:style>
+          <a:lnRef idx="2">
+            <a:schemeClr val="accent1">
+              <a:shade val="50000"/>
+            </a:schemeClr>
+          </a:lnRef>
+          <a:fillRef idx="1">
+            <a:schemeClr val="accent1"/>
+          </a:fillRef>
+          <a:effectRef idx="0">
+            <a:schemeClr val="accent1"/>
+          </a:effectRef>
+          <a:fontRef idx="minor">
+            <a:schemeClr val="lt1"/>
+          </a:fontRef>
+        </p:style>
+        <p:txBody>
+          <a:bodyPr rtlCol="0" anchor="ctr"/>
+          <a:lstStyle/>
+          <a:p>
+            <a:pPr algn="ctr"/>
+            <a:endParaRPr lang="zh-CN" altLang="en-US"/>
+          </a:p>
+        </p:txBody>
+      </p:sp>
+      <p:cxnSp>
+        <p:nvCxnSpPr>
+          <p:cNvPr id="174" name="直接连接符 173">
+            <a:extLst>
+              <a:ext uri="{FF2B5EF4-FFF2-40B4-BE49-F238E27FC236}">
+                <a16:creationId xmlns:a16="http://schemas.microsoft.com/office/drawing/2014/main" id="{00DB529F-06D9-4C50-85AC-4F8D2909B9B1}"/>
+              </a:ext>
+            </a:extLst>
+          </p:cNvPr>
+          <p:cNvCxnSpPr>
+            <a:cxnSpLocks/>
+            <a:stCxn id="163" idx="1"/>
+            <a:endCxn id="133" idx="3"/>
+          </p:cNvCxnSpPr>
+          <p:nvPr/>
+        </p:nvCxnSpPr>
+        <p:spPr>
+          <a:xfrm flipH="1">
+            <a:off x="8200403" y="3265973"/>
+            <a:ext cx="1312994" cy="1370"/>
+          </a:xfrm>
+          <a:prstGeom prst="line">
+            <a:avLst/>
+          </a:prstGeom>
+          <a:ln w="19050">
+            <a:solidFill>
+              <a:schemeClr val="tx1"/>
+            </a:solidFill>
+            <a:prstDash val="solid"/>
+            <a:headEnd type="none" w="med" len="med"/>
+            <a:tailEnd type="arrow" w="med" len="med"/>
+          </a:ln>
+        </p:spPr>
+        <p:style>
+          <a:lnRef idx="1">
+            <a:schemeClr val="accent1"/>
+          </a:lnRef>
+          <a:fillRef idx="0">
+            <a:schemeClr val="accent1"/>
+          </a:fillRef>
+          <a:effectRef idx="0">
+            <a:schemeClr val="accent1"/>
+          </a:effectRef>
+          <a:fontRef idx="minor">
+            <a:schemeClr val="tx1"/>
+          </a:fontRef>
+        </p:style>
+      </p:cxnSp>
+      <p:sp>
+        <p:nvSpPr>
+          <p:cNvPr id="182" name="矩形 181">
+            <a:extLst>
+              <a:ext uri="{FF2B5EF4-FFF2-40B4-BE49-F238E27FC236}">
+                <a16:creationId xmlns:a16="http://schemas.microsoft.com/office/drawing/2014/main" id="{54B98A17-127E-4B18-AF50-689B2B6C2258}"/>
+              </a:ext>
+            </a:extLst>
+          </p:cNvPr>
+          <p:cNvSpPr/>
+          <p:nvPr/>
+        </p:nvSpPr>
+        <p:spPr>
+          <a:xfrm>
+            <a:off x="6313474" y="2527907"/>
+            <a:ext cx="1265106" cy="317381"/>
+          </a:xfrm>
+          <a:prstGeom prst="rect">
+            <a:avLst/>
+          </a:prstGeom>
+          <a:solidFill>
+            <a:schemeClr val="bg1"/>
+          </a:solidFill>
+          <a:ln>
+            <a:solidFill>
+              <a:schemeClr val="tx1"/>
+            </a:solidFill>
+          </a:ln>
+        </p:spPr>
+        <p:style>
+          <a:lnRef idx="2">
+            <a:schemeClr val="accent1">
+              <a:shade val="50000"/>
+            </a:schemeClr>
+          </a:lnRef>
+          <a:fillRef idx="1">
+            <a:schemeClr val="accent1"/>
+          </a:fillRef>
+          <a:effectRef idx="0">
+            <a:schemeClr val="accent1"/>
+          </a:effectRef>
+          <a:fontRef idx="minor">
+            <a:schemeClr val="lt1"/>
+          </a:fontRef>
+        </p:style>
+        <p:txBody>
+          <a:bodyPr rtlCol="0" anchor="ctr"/>
+          <a:lstStyle/>
+          <a:p>
+            <a:pPr algn="ctr"/>
+            <a:endParaRPr lang="zh-CN" altLang="en-US"/>
+          </a:p>
+        </p:txBody>
+      </p:sp>
+      <p:sp>
+        <p:nvSpPr>
+          <p:cNvPr id="183" name="文本框 182">
+            <a:extLst>
+              <a:ext uri="{FF2B5EF4-FFF2-40B4-BE49-F238E27FC236}">
+                <a16:creationId xmlns:a16="http://schemas.microsoft.com/office/drawing/2014/main" id="{72049BE5-E4AD-432D-A321-48FA501EF4A1}"/>
+              </a:ext>
+            </a:extLst>
+          </p:cNvPr>
+          <p:cNvSpPr txBox="1"/>
+          <p:nvPr/>
+        </p:nvSpPr>
+        <p:spPr>
+          <a:xfrm>
+            <a:off x="6172605" y="2494251"/>
+            <a:ext cx="1577385" cy="369332"/>
+          </a:xfrm>
+          <a:prstGeom prst="rect">
+            <a:avLst/>
+          </a:prstGeom>
+          <a:noFill/>
+        </p:spPr>
+        <p:txBody>
+          <a:bodyPr wrap="square" rtlCol="0">
+            <a:spAutoFit/>
+          </a:bodyPr>
+          <a:lstStyle/>
+          <a:p>
+            <a:pPr algn="ctr"/>
+            <a:r>
+              <a:rPr lang="en-US" altLang="zh-CN" dirty="0">
+                <a:solidFill>
+                  <a:schemeClr val="accent2"/>
+                </a:solidFill>
+                <a:latin typeface="Times New Roman" panose="02020603050405020304" pitchFamily="18" charset="0"/>
+                <a:cs typeface="Times New Roman" panose="02020603050405020304" pitchFamily="18" charset="0"/>
+              </a:rPr>
+              <a:t>{states, Json}</a:t>
+            </a:r>
+            <a:endParaRPr lang="zh-CN" altLang="en-US" dirty="0">
+              <a:solidFill>
+                <a:schemeClr val="accent2"/>
+              </a:solidFill>
+              <a:latin typeface="Times New Roman" panose="02020603050405020304" pitchFamily="18" charset="0"/>
+              <a:cs typeface="Times New Roman" panose="02020603050405020304" pitchFamily="18" charset="0"/>
+            </a:endParaRPr>
+          </a:p>
+        </p:txBody>
+      </p:sp>
+      <p:sp>
+        <p:nvSpPr>
+          <p:cNvPr id="186" name="文本框 185">
+            <a:extLst>
+              <a:ext uri="{FF2B5EF4-FFF2-40B4-BE49-F238E27FC236}">
+                <a16:creationId xmlns:a16="http://schemas.microsoft.com/office/drawing/2014/main" id="{D6F9ADD3-9500-4F54-B6FB-6684BD6A3291}"/>
+              </a:ext>
+            </a:extLst>
+          </p:cNvPr>
+          <p:cNvSpPr txBox="1"/>
+          <p:nvPr/>
+        </p:nvSpPr>
+        <p:spPr>
+          <a:xfrm>
+            <a:off x="8687920" y="471339"/>
+            <a:ext cx="2581922" cy="369332"/>
+          </a:xfrm>
+          <a:prstGeom prst="rect">
+            <a:avLst/>
+          </a:prstGeom>
+          <a:noFill/>
+        </p:spPr>
+        <p:txBody>
+          <a:bodyPr wrap="square" rtlCol="0">
+            <a:spAutoFit/>
+          </a:bodyPr>
+          <a:lstStyle/>
+          <a:p>
+            <a:pPr algn="ctr"/>
+            <a:r>
+              <a:rPr lang="en-US" altLang="zh-CN" dirty="0">
+                <a:latin typeface="Times New Roman" panose="02020603050405020304" pitchFamily="18" charset="0"/>
+                <a:cs typeface="Times New Roman" panose="02020603050405020304" pitchFamily="18" charset="0"/>
+              </a:rPr>
+              <a:t>Client API</a:t>
+            </a:r>
+            <a:endParaRPr lang="zh-CN" altLang="en-US" dirty="0">
+              <a:latin typeface="Times New Roman" panose="02020603050405020304" pitchFamily="18" charset="0"/>
+              <a:cs typeface="Times New Roman" panose="02020603050405020304" pitchFamily="18" charset="0"/>
+            </a:endParaRPr>
+          </a:p>
+        </p:txBody>
+      </p:sp>
+      <p:sp>
+        <p:nvSpPr>
+          <p:cNvPr id="187" name="流程图: 卡片 186">
+            <a:extLst>
+              <a:ext uri="{FF2B5EF4-FFF2-40B4-BE49-F238E27FC236}">
+                <a16:creationId xmlns:a16="http://schemas.microsoft.com/office/drawing/2014/main" id="{507A7306-5D47-42BE-87BD-B7215217F6E7}"/>
+              </a:ext>
+            </a:extLst>
+          </p:cNvPr>
+          <p:cNvSpPr/>
+          <p:nvPr/>
+        </p:nvSpPr>
+        <p:spPr>
+          <a:xfrm>
+            <a:off x="9095554" y="855092"/>
+            <a:ext cx="1766655" cy="628073"/>
+          </a:xfrm>
+          <a:prstGeom prst="flowChartPunchedCard">
+            <a:avLst/>
+          </a:prstGeom>
+          <a:solidFill>
+            <a:schemeClr val="bg1">
+              <a:lumMod val="85000"/>
+            </a:schemeClr>
+          </a:solidFill>
+          <a:ln w="19050">
+            <a:solidFill>
+              <a:schemeClr val="tx1"/>
+            </a:solidFill>
+          </a:ln>
+        </p:spPr>
+        <p:style>
+          <a:lnRef idx="2">
+            <a:schemeClr val="accent1">
+              <a:shade val="50000"/>
+            </a:schemeClr>
+          </a:lnRef>
+          <a:fillRef idx="1">
+            <a:schemeClr val="accent1"/>
+          </a:fillRef>
+          <a:effectRef idx="0">
+            <a:schemeClr val="accent1"/>
+          </a:effectRef>
+          <a:fontRef idx="minor">
+            <a:schemeClr val="lt1"/>
+          </a:fontRef>
+        </p:style>
+        <p:txBody>
+          <a:bodyPr rot="0" spcFirstLastPara="0" vertOverflow="overflow" horzOverflow="overflow" vert="horz" wrap="square" lIns="91440" tIns="45720" rIns="91440" bIns="45720" numCol="1" spcCol="0" rtlCol="0" fromWordArt="0" anchor="ctr" anchorCtr="0" forceAA="0" compatLnSpc="1">
+            <a:prstTxWarp prst="textNoShape">
+              <a:avLst/>
+            </a:prstTxWarp>
+            <a:noAutofit/>
+          </a:bodyPr>
+          <a:lstStyle/>
+          <a:p>
+            <a:pPr algn="ctr"/>
+            <a:endParaRPr lang="zh-CN" altLang="en-US" sz="1600" i="1" dirty="0">
+              <a:solidFill>
+                <a:schemeClr val="accent2"/>
+              </a:solidFill>
+              <a:latin typeface="Times New Roman" panose="02020603050405020304" pitchFamily="18" charset="0"/>
+              <a:cs typeface="Times New Roman" panose="02020603050405020304" pitchFamily="18" charset="0"/>
+            </a:endParaRPr>
+          </a:p>
+        </p:txBody>
+      </p:sp>
+      <p:sp>
+        <p:nvSpPr>
+          <p:cNvPr id="189" name="矩形 188">
+            <a:extLst>
+              <a:ext uri="{FF2B5EF4-FFF2-40B4-BE49-F238E27FC236}">
+                <a16:creationId xmlns:a16="http://schemas.microsoft.com/office/drawing/2014/main" id="{B19B9F03-E288-4F3A-B07A-8BF3181719D3}"/>
+              </a:ext>
+            </a:extLst>
+          </p:cNvPr>
+          <p:cNvSpPr/>
+          <p:nvPr/>
+        </p:nvSpPr>
+        <p:spPr>
+          <a:xfrm>
+            <a:off x="1005702" y="916037"/>
+            <a:ext cx="1719125" cy="584775"/>
+          </a:xfrm>
+          <a:prstGeom prst="rect">
+            <a:avLst/>
+          </a:prstGeom>
+        </p:spPr>
+        <p:txBody>
+          <a:bodyPr wrap="none">
+            <a:spAutoFit/>
+          </a:bodyPr>
+          <a:lstStyle/>
+          <a:p>
+            <a:pPr algn="ctr"/>
+            <a:r>
+              <a:rPr lang="en-US" altLang="zh-CN" sz="1600" i="1" dirty="0" err="1">
+                <a:latin typeface="Times New Roman" panose="02020603050405020304" pitchFamily="18" charset="0"/>
+                <a:cs typeface="Times New Roman" panose="02020603050405020304" pitchFamily="18" charset="0"/>
+              </a:rPr>
+              <a:t>createAndStartVM</a:t>
+            </a:r>
+            <a:endParaRPr lang="en-US" altLang="zh-CN" sz="1600" i="1" dirty="0">
+              <a:latin typeface="Times New Roman" panose="02020603050405020304" pitchFamily="18" charset="0"/>
+              <a:cs typeface="Times New Roman" panose="02020603050405020304" pitchFamily="18" charset="0"/>
+            </a:endParaRPr>
+          </a:p>
+          <a:p>
+            <a:pPr algn="ctr"/>
+            <a:r>
+              <a:rPr lang="en-US" altLang="zh-CN" sz="1600" dirty="0">
+                <a:solidFill>
+                  <a:schemeClr val="accent2"/>
+                </a:solidFill>
+                <a:latin typeface="Times New Roman" panose="02020603050405020304" pitchFamily="18" charset="0"/>
+                <a:cs typeface="Times New Roman" panose="02020603050405020304" pitchFamily="18" charset="0"/>
+              </a:rPr>
+              <a:t>(YAML)</a:t>
+            </a:r>
+            <a:endParaRPr lang="zh-CN" altLang="en-US" sz="1600" i="1" dirty="0">
+              <a:solidFill>
+                <a:schemeClr val="accent2"/>
+              </a:solidFill>
+              <a:latin typeface="Times New Roman" panose="02020603050405020304" pitchFamily="18" charset="0"/>
+              <a:cs typeface="Times New Roman" panose="02020603050405020304" pitchFamily="18" charset="0"/>
+            </a:endParaRPr>
+          </a:p>
+        </p:txBody>
+      </p:sp>
+      <p:sp>
+        <p:nvSpPr>
+          <p:cNvPr id="197" name="矩形 196">
+            <a:extLst>
+              <a:ext uri="{FF2B5EF4-FFF2-40B4-BE49-F238E27FC236}">
+                <a16:creationId xmlns:a16="http://schemas.microsoft.com/office/drawing/2014/main" id="{8CF0CB78-4312-41E1-A54B-04EAF0F3650B}"/>
+              </a:ext>
+            </a:extLst>
+          </p:cNvPr>
+          <p:cNvSpPr/>
+          <p:nvPr/>
+        </p:nvSpPr>
+        <p:spPr>
+          <a:xfrm>
+            <a:off x="1006995" y="3604211"/>
+            <a:ext cx="1041733" cy="366733"/>
+          </a:xfrm>
+          <a:prstGeom prst="rect">
+            <a:avLst/>
+          </a:prstGeom>
+          <a:solidFill>
+            <a:schemeClr val="bg1"/>
+          </a:solidFill>
+          <a:ln>
+            <a:solidFill>
+              <a:schemeClr val="tx1"/>
+            </a:solidFill>
+          </a:ln>
+        </p:spPr>
+        <p:style>
+          <a:lnRef idx="2">
+            <a:schemeClr val="accent1">
+              <a:shade val="50000"/>
+            </a:schemeClr>
+          </a:lnRef>
+          <a:fillRef idx="1">
+            <a:schemeClr val="accent1"/>
+          </a:fillRef>
+          <a:effectRef idx="0">
+            <a:schemeClr val="accent1"/>
+          </a:effectRef>
+          <a:fontRef idx="minor">
+            <a:schemeClr val="lt1"/>
+          </a:fontRef>
+        </p:style>
+        <p:txBody>
+          <a:bodyPr rtlCol="0" anchor="ctr"/>
+          <a:lstStyle/>
+          <a:p>
+            <a:pPr algn="ctr"/>
+            <a:endParaRPr lang="zh-CN" altLang="en-US"/>
+          </a:p>
+        </p:txBody>
+      </p:sp>
+      <p:sp>
+        <p:nvSpPr>
+          <p:cNvPr id="198" name="矩形 197">
+            <a:extLst>
+              <a:ext uri="{FF2B5EF4-FFF2-40B4-BE49-F238E27FC236}">
+                <a16:creationId xmlns:a16="http://schemas.microsoft.com/office/drawing/2014/main" id="{75E0CD38-350B-4D16-AC07-8A9CFC2AE0EA}"/>
+              </a:ext>
+            </a:extLst>
+          </p:cNvPr>
+          <p:cNvSpPr/>
+          <p:nvPr/>
+        </p:nvSpPr>
+        <p:spPr>
+          <a:xfrm>
+            <a:off x="872982" y="3603197"/>
+            <a:ext cx="1350946" cy="403765"/>
+          </a:xfrm>
+          <a:prstGeom prst="rect">
+            <a:avLst/>
+          </a:prstGeom>
+        </p:spPr>
+        <p:txBody>
+          <a:bodyPr wrap="square">
+            <a:spAutoFit/>
+          </a:bodyPr>
+          <a:lstStyle/>
+          <a:p>
+            <a:pPr algn="ctr">
+              <a:lnSpc>
+                <a:spcPts val="1200"/>
+              </a:lnSpc>
+            </a:pPr>
+            <a:r>
+              <a:rPr lang="en-US" altLang="zh-CN" sz="1400" i="1" dirty="0">
+                <a:latin typeface="Times New Roman" panose="02020603050405020304" pitchFamily="18" charset="0"/>
+                <a:cs typeface="Times New Roman" panose="02020603050405020304" pitchFamily="18" charset="0"/>
+              </a:rPr>
+              <a:t>Operation</a:t>
+            </a:r>
+            <a:r>
+              <a:rPr lang="en-US" altLang="zh-CN" sz="1400" dirty="0">
+                <a:latin typeface="Times New Roman" panose="02020603050405020304" pitchFamily="18" charset="0"/>
+                <a:cs typeface="Times New Roman" panose="02020603050405020304" pitchFamily="18" charset="0"/>
+              </a:rPr>
+              <a:t>:</a:t>
+            </a:r>
+          </a:p>
+          <a:p>
+            <a:pPr algn="ctr">
+              <a:lnSpc>
+                <a:spcPts val="1200"/>
+              </a:lnSpc>
+            </a:pPr>
+            <a:r>
+              <a:rPr lang="en-US" altLang="zh-CN" sz="1400" dirty="0">
+                <a:solidFill>
+                  <a:schemeClr val="accent2"/>
+                </a:solidFill>
+                <a:latin typeface="Times New Roman" panose="02020603050405020304" pitchFamily="18" charset="0"/>
+                <a:cs typeface="Times New Roman" panose="02020603050405020304" pitchFamily="18" charset="0"/>
+              </a:rPr>
+              <a:t>(ADDED)</a:t>
+            </a:r>
+            <a:endParaRPr lang="zh-CN" altLang="en-US" sz="1400" dirty="0">
+              <a:solidFill>
+                <a:schemeClr val="accent2"/>
+              </a:solidFill>
+              <a:latin typeface="Times New Roman" panose="02020603050405020304" pitchFamily="18" charset="0"/>
+              <a:cs typeface="Times New Roman" panose="02020603050405020304" pitchFamily="18" charset="0"/>
+            </a:endParaRPr>
+          </a:p>
+        </p:txBody>
+      </p:sp>
+      <p:cxnSp>
+        <p:nvCxnSpPr>
+          <p:cNvPr id="199" name="直接连接符 198">
+            <a:extLst>
+              <a:ext uri="{FF2B5EF4-FFF2-40B4-BE49-F238E27FC236}">
+                <a16:creationId xmlns:a16="http://schemas.microsoft.com/office/drawing/2014/main" id="{2123D9E3-61DF-4D37-86B7-2E55176CA561}"/>
+              </a:ext>
+            </a:extLst>
+          </p:cNvPr>
+          <p:cNvCxnSpPr>
+            <a:cxnSpLocks/>
+            <a:endCxn id="187" idx="2"/>
+          </p:cNvCxnSpPr>
+          <p:nvPr/>
+        </p:nvCxnSpPr>
+        <p:spPr>
+          <a:xfrm flipV="1">
+            <a:off x="9978882" y="1483165"/>
+            <a:ext cx="0" cy="318426"/>
+          </a:xfrm>
+          <a:prstGeom prst="line">
+            <a:avLst/>
+          </a:prstGeom>
+          <a:ln w="19050">
+            <a:solidFill>
+              <a:schemeClr val="tx1"/>
+            </a:solidFill>
+            <a:prstDash val="solid"/>
+            <a:headEnd type="none" w="med" len="med"/>
+            <a:tailEnd type="arrow" w="med" len="med"/>
+          </a:ln>
+        </p:spPr>
+        <p:style>
+          <a:lnRef idx="1">
+            <a:schemeClr val="accent1"/>
+          </a:lnRef>
+          <a:fillRef idx="0">
+            <a:schemeClr val="accent1"/>
+          </a:fillRef>
+          <a:effectRef idx="0">
+            <a:schemeClr val="accent1"/>
+          </a:effectRef>
+          <a:fontRef idx="minor">
+            <a:schemeClr val="tx1"/>
+          </a:fontRef>
+        </p:style>
+      </p:cxnSp>
+      <p:sp>
+        <p:nvSpPr>
+          <p:cNvPr id="206" name="矩形 205">
+            <a:extLst>
+              <a:ext uri="{FF2B5EF4-FFF2-40B4-BE49-F238E27FC236}">
+                <a16:creationId xmlns:a16="http://schemas.microsoft.com/office/drawing/2014/main" id="{26DAB628-46BC-40C5-ABDB-62B346B7F82B}"/>
+              </a:ext>
+            </a:extLst>
+          </p:cNvPr>
+          <p:cNvSpPr/>
+          <p:nvPr/>
+        </p:nvSpPr>
+        <p:spPr>
+          <a:xfrm>
+            <a:off x="9152982" y="913046"/>
+            <a:ext cx="1651799" cy="584775"/>
+          </a:xfrm>
+          <a:prstGeom prst="rect">
+            <a:avLst/>
+          </a:prstGeom>
+        </p:spPr>
+        <p:txBody>
+          <a:bodyPr wrap="none">
+            <a:spAutoFit/>
+          </a:bodyPr>
+          <a:lstStyle/>
+          <a:p>
+            <a:pPr algn="ctr"/>
+            <a:r>
+              <a:rPr lang="en-US" altLang="zh-CN" sz="1600" i="1" dirty="0" err="1">
+                <a:latin typeface="Times New Roman" panose="02020603050405020304" pitchFamily="18" charset="0"/>
+                <a:cs typeface="Times New Roman" panose="02020603050405020304" pitchFamily="18" charset="0"/>
+              </a:rPr>
+              <a:t>synchronizeStates</a:t>
+            </a:r>
+            <a:endParaRPr lang="en-US" altLang="zh-CN" sz="1600" i="1" dirty="0">
+              <a:latin typeface="Times New Roman" panose="02020603050405020304" pitchFamily="18" charset="0"/>
+              <a:cs typeface="Times New Roman" panose="02020603050405020304" pitchFamily="18" charset="0"/>
+            </a:endParaRPr>
+          </a:p>
+          <a:p>
+            <a:pPr algn="ctr"/>
+            <a:r>
+              <a:rPr lang="en-US" altLang="zh-CN" sz="1600" dirty="0">
+                <a:solidFill>
+                  <a:schemeClr val="accent2"/>
+                </a:solidFill>
+                <a:latin typeface="Times New Roman" panose="02020603050405020304" pitchFamily="18" charset="0"/>
+                <a:cs typeface="Times New Roman" panose="02020603050405020304" pitchFamily="18" charset="0"/>
+              </a:rPr>
+              <a:t>(YAML)</a:t>
+            </a:r>
+            <a:endParaRPr lang="zh-CN" altLang="en-US" sz="1600" i="1" dirty="0">
+              <a:solidFill>
+                <a:schemeClr val="accent2"/>
+              </a:solidFill>
+              <a:latin typeface="Times New Roman" panose="02020603050405020304" pitchFamily="18" charset="0"/>
+              <a:cs typeface="Times New Roman" panose="02020603050405020304" pitchFamily="18" charset="0"/>
+            </a:endParaRPr>
+          </a:p>
+        </p:txBody>
+      </p:sp>
+      <p:sp>
+        <p:nvSpPr>
+          <p:cNvPr id="9" name="爆炸形: 8 pt  8">
+            <a:extLst>
+              <a:ext uri="{FF2B5EF4-FFF2-40B4-BE49-F238E27FC236}">
+                <a16:creationId xmlns:a16="http://schemas.microsoft.com/office/drawing/2014/main" id="{D59F1C85-E395-43AD-912A-7770FBC391E7}"/>
+              </a:ext>
+            </a:extLst>
+          </p:cNvPr>
+          <p:cNvSpPr/>
+          <p:nvPr/>
+        </p:nvSpPr>
+        <p:spPr>
+          <a:xfrm>
+            <a:off x="7041932" y="5357358"/>
+            <a:ext cx="771896" cy="713798"/>
+          </a:xfrm>
+          <a:prstGeom prst="irregularSeal1">
             <a:avLst/>
           </a:prstGeom>
           <a:solidFill>
@@ -6203,9 +7637,15 @@
             </a:solidFill>
           </a:ln>
           <a:effectLst>
-            <a:outerShdw blurRad="50800" dist="38100" dir="2700000" algn="tl" rotWithShape="0">
+            <a:glow rad="139700">
+              <a:schemeClr val="accent2">
+                <a:satMod val="175000"/>
+                <a:alpha val="40000"/>
+              </a:schemeClr>
+            </a:glow>
+            <a:outerShdw blurRad="76200" dir="18900000" sy="23000" kx="-1200000" algn="bl" rotWithShape="0">
               <a:prstClr val="black">
-                <a:alpha val="40000"/>
+                <a:alpha val="20000"/>
               </a:prstClr>
             </a:outerShdw>
           </a:effectLst>
@@ -6246,10 +7686,10 @@
       </p:sp>
       <p:sp>
         <p:nvSpPr>
-          <p:cNvPr id="145" name="箭头: 左弧形 144">
-            <a:extLst>
-              <a:ext uri="{FF2B5EF4-FFF2-40B4-BE49-F238E27FC236}">
-                <a16:creationId xmlns:a16="http://schemas.microsoft.com/office/drawing/2014/main" id="{E53FB1B6-BCA7-428E-80F6-5DC9C350F33E}"/>
+          <p:cNvPr id="146" name="矩形 145">
+            <a:extLst>
+              <a:ext uri="{FF2B5EF4-FFF2-40B4-BE49-F238E27FC236}">
+                <a16:creationId xmlns:a16="http://schemas.microsoft.com/office/drawing/2014/main" id="{1D40F2E5-7E7A-4F80-92EC-1A9999B35304}"/>
               </a:ext>
             </a:extLst>
           </p:cNvPr>
@@ -6257,81 +7697,9 @@
           <p:nvPr/>
         </p:nvSpPr>
         <p:spPr>
-          <a:xfrm rot="10800000">
-            <a:off x="10405092" y="5521911"/>
-            <a:ext cx="468573" cy="590091"/>
-          </a:xfrm>
-          <a:prstGeom prst="curvedRightArrow">
-            <a:avLst/>
-          </a:prstGeom>
-          <a:solidFill>
-            <a:schemeClr val="bg2">
-              <a:lumMod val="90000"/>
-            </a:schemeClr>
-          </a:solidFill>
-          <a:ln>
-            <a:solidFill>
-              <a:schemeClr val="tx1"/>
-            </a:solidFill>
-          </a:ln>
-          <a:effectLst>
-            <a:outerShdw blurRad="50800" dist="38100" dir="2700000" algn="tl" rotWithShape="0">
-              <a:prstClr val="black">
-                <a:alpha val="40000"/>
-              </a:prstClr>
-            </a:outerShdw>
-          </a:effectLst>
-        </p:spPr>
-        <p:style>
-          <a:lnRef idx="2">
-            <a:schemeClr val="accent1">
-              <a:shade val="50000"/>
-            </a:schemeClr>
-          </a:lnRef>
-          <a:fillRef idx="1">
-            <a:schemeClr val="accent1"/>
-          </a:fillRef>
-          <a:effectRef idx="0">
-            <a:schemeClr val="accent1"/>
-          </a:effectRef>
-          <a:fontRef idx="minor">
-            <a:schemeClr val="lt1"/>
-          </a:fontRef>
-        </p:style>
-        <p:txBody>
-          <a:bodyPr rot="0" spcFirstLastPara="0" vertOverflow="overflow" horzOverflow="overflow" vert="horz" wrap="square" lIns="91440" tIns="45720" rIns="91440" bIns="45720" numCol="1" spcCol="0" rtlCol="0" fromWordArt="0" anchor="ctr" anchorCtr="0" forceAA="0" compatLnSpc="1">
-            <a:prstTxWarp prst="textNoShape">
-              <a:avLst/>
-            </a:prstTxWarp>
-            <a:noAutofit/>
-          </a:bodyPr>
-          <a:lstStyle/>
-          <a:p>
-            <a:pPr algn="ctr"/>
-            <a:endParaRPr lang="zh-CN" altLang="en-US">
-              <a:solidFill>
-                <a:schemeClr val="tx1"/>
-              </a:solidFill>
-            </a:endParaRPr>
-          </a:p>
-        </p:txBody>
-      </p:sp>
-      <p:sp>
-        <p:nvSpPr>
-          <p:cNvPr id="146" name="矩形 145">
-            <a:extLst>
-              <a:ext uri="{FF2B5EF4-FFF2-40B4-BE49-F238E27FC236}">
-                <a16:creationId xmlns:a16="http://schemas.microsoft.com/office/drawing/2014/main" id="{1D40F2E5-7E7A-4F80-92EC-1A9999B35304}"/>
-              </a:ext>
-            </a:extLst>
-          </p:cNvPr>
-          <p:cNvSpPr/>
-          <p:nvPr/>
-        </p:nvSpPr>
-        <p:spPr>
           <a:xfrm>
-            <a:off x="7755011" y="5555567"/>
-            <a:ext cx="814115" cy="317381"/>
+            <a:off x="7601268" y="5623220"/>
+            <a:ext cx="1129109" cy="317381"/>
           </a:xfrm>
           <a:prstGeom prst="rect">
             <a:avLst/>
@@ -6384,8 +7752,8 @@
         </p:nvSpPr>
         <p:spPr>
           <a:xfrm>
-            <a:off x="7614143" y="5521911"/>
-            <a:ext cx="1098932" cy="369332"/>
+            <a:off x="7540953" y="5592451"/>
+            <a:ext cx="1256262" cy="369332"/>
           </a:xfrm>
           <a:prstGeom prst="rect">
             <a:avLst/>
@@ -6407,1443 +7775,9 @@
                 <a:latin typeface="Times New Roman" panose="02020603050405020304" pitchFamily="18" charset="0"/>
                 <a:cs typeface="Times New Roman" panose="02020603050405020304" pitchFamily="18" charset="0"/>
               </a:rPr>
-              <a:t>Cyclic </a:t>
+              <a:t>Event Loop </a:t>
             </a:r>
             <a:endParaRPr lang="zh-CN" altLang="en-US" dirty="0">
-              <a:solidFill>
-                <a:schemeClr val="accent2"/>
-              </a:solidFill>
-              <a:latin typeface="Times New Roman" panose="02020603050405020304" pitchFamily="18" charset="0"/>
-              <a:cs typeface="Times New Roman" panose="02020603050405020304" pitchFamily="18" charset="0"/>
-            </a:endParaRPr>
-          </a:p>
-        </p:txBody>
-      </p:sp>
-      <p:sp>
-        <p:nvSpPr>
-          <p:cNvPr id="148" name="矩形 147">
-            <a:extLst>
-              <a:ext uri="{FF2B5EF4-FFF2-40B4-BE49-F238E27FC236}">
-                <a16:creationId xmlns:a16="http://schemas.microsoft.com/office/drawing/2014/main" id="{B24A2483-AE17-4B55-8C1B-DFC8CC6BA8D0}"/>
-              </a:ext>
-            </a:extLst>
-          </p:cNvPr>
-          <p:cNvSpPr/>
-          <p:nvPr/>
-        </p:nvSpPr>
-        <p:spPr>
-          <a:xfrm>
-            <a:off x="10769940" y="5654544"/>
-            <a:ext cx="814115" cy="317381"/>
-          </a:xfrm>
-          <a:prstGeom prst="rect">
-            <a:avLst/>
-          </a:prstGeom>
-          <a:solidFill>
-            <a:schemeClr val="bg1"/>
-          </a:solidFill>
-          <a:ln>
-            <a:solidFill>
-              <a:schemeClr val="tx1"/>
-            </a:solidFill>
-          </a:ln>
-        </p:spPr>
-        <p:style>
-          <a:lnRef idx="2">
-            <a:schemeClr val="accent1">
-              <a:shade val="50000"/>
-            </a:schemeClr>
-          </a:lnRef>
-          <a:fillRef idx="1">
-            <a:schemeClr val="accent1"/>
-          </a:fillRef>
-          <a:effectRef idx="0">
-            <a:schemeClr val="accent1"/>
-          </a:effectRef>
-          <a:fontRef idx="minor">
-            <a:schemeClr val="lt1"/>
-          </a:fontRef>
-        </p:style>
-        <p:txBody>
-          <a:bodyPr rtlCol="0" anchor="ctr"/>
-          <a:lstStyle/>
-          <a:p>
-            <a:pPr algn="ctr"/>
-            <a:endParaRPr lang="zh-CN" altLang="en-US"/>
-          </a:p>
-        </p:txBody>
-      </p:sp>
-      <p:sp>
-        <p:nvSpPr>
-          <p:cNvPr id="149" name="文本框 148">
-            <a:extLst>
-              <a:ext uri="{FF2B5EF4-FFF2-40B4-BE49-F238E27FC236}">
-                <a16:creationId xmlns:a16="http://schemas.microsoft.com/office/drawing/2014/main" id="{007D7452-A6CA-4892-A596-FDFF4ED98821}"/>
-              </a:ext>
-            </a:extLst>
-          </p:cNvPr>
-          <p:cNvSpPr txBox="1"/>
-          <p:nvPr/>
-        </p:nvSpPr>
-        <p:spPr>
-          <a:xfrm>
-            <a:off x="10629072" y="5620888"/>
-            <a:ext cx="1098932" cy="369332"/>
-          </a:xfrm>
-          <a:prstGeom prst="rect">
-            <a:avLst/>
-          </a:prstGeom>
-          <a:noFill/>
-        </p:spPr>
-        <p:txBody>
-          <a:bodyPr wrap="square" rtlCol="0">
-            <a:spAutoFit/>
-          </a:bodyPr>
-          <a:lstStyle/>
-          <a:p>
-            <a:pPr algn="ctr"/>
-            <a:r>
-              <a:rPr lang="en-US" altLang="zh-CN" dirty="0">
-                <a:solidFill>
-                  <a:schemeClr val="accent2"/>
-                </a:solidFill>
-                <a:latin typeface="Times New Roman" panose="02020603050405020304" pitchFamily="18" charset="0"/>
-                <a:cs typeface="Times New Roman" panose="02020603050405020304" pitchFamily="18" charset="0"/>
-              </a:rPr>
-              <a:t>Cyclic </a:t>
-            </a:r>
-            <a:endParaRPr lang="zh-CN" altLang="en-US" dirty="0">
-              <a:solidFill>
-                <a:schemeClr val="accent2"/>
-              </a:solidFill>
-              <a:latin typeface="Times New Roman" panose="02020603050405020304" pitchFamily="18" charset="0"/>
-              <a:cs typeface="Times New Roman" panose="02020603050405020304" pitchFamily="18" charset="0"/>
-            </a:endParaRPr>
-          </a:p>
-        </p:txBody>
-      </p:sp>
-      <p:sp>
-        <p:nvSpPr>
-          <p:cNvPr id="150" name="矩形: 圆角 149">
-            <a:extLst>
-              <a:ext uri="{FF2B5EF4-FFF2-40B4-BE49-F238E27FC236}">
-                <a16:creationId xmlns:a16="http://schemas.microsoft.com/office/drawing/2014/main" id="{B3858B09-7AF0-4D53-9E9F-E0F9750CBF20}"/>
-              </a:ext>
-            </a:extLst>
-          </p:cNvPr>
-          <p:cNvSpPr/>
-          <p:nvPr/>
-        </p:nvSpPr>
-        <p:spPr>
-          <a:xfrm>
-            <a:off x="6558034" y="4026845"/>
-            <a:ext cx="1642368" cy="568765"/>
-          </a:xfrm>
-          <a:prstGeom prst="roundRect">
-            <a:avLst/>
-          </a:prstGeom>
-          <a:solidFill>
-            <a:schemeClr val="bg1">
-              <a:lumMod val="85000"/>
-            </a:schemeClr>
-          </a:solidFill>
-          <a:ln>
-            <a:solidFill>
-              <a:schemeClr val="tx1"/>
-            </a:solidFill>
-          </a:ln>
-        </p:spPr>
-        <p:style>
-          <a:lnRef idx="2">
-            <a:schemeClr val="accent1">
-              <a:shade val="50000"/>
-            </a:schemeClr>
-          </a:lnRef>
-          <a:fillRef idx="1">
-            <a:schemeClr val="accent1"/>
-          </a:fillRef>
-          <a:effectRef idx="0">
-            <a:schemeClr val="accent1"/>
-          </a:effectRef>
-          <a:fontRef idx="minor">
-            <a:schemeClr val="lt1"/>
-          </a:fontRef>
-        </p:style>
-        <p:txBody>
-          <a:bodyPr rtlCol="0" anchor="ctr"/>
-          <a:lstStyle/>
-          <a:p>
-            <a:pPr algn="ctr"/>
-            <a:r>
-              <a:rPr lang="en-US" altLang="zh-CN" sz="2000" dirty="0">
-                <a:solidFill>
-                  <a:schemeClr val="tx1"/>
-                </a:solidFill>
-                <a:latin typeface="Times New Roman" panose="02020603050405020304" pitchFamily="18" charset="0"/>
-                <a:cs typeface="Times New Roman" panose="02020603050405020304" pitchFamily="18" charset="0"/>
-              </a:rPr>
-              <a:t>VM Cycler</a:t>
-            </a:r>
-            <a:endParaRPr lang="zh-CN" altLang="en-US" sz="2000" dirty="0">
-              <a:solidFill>
-                <a:schemeClr val="tx1"/>
-              </a:solidFill>
-              <a:latin typeface="Times New Roman" panose="02020603050405020304" pitchFamily="18" charset="0"/>
-              <a:cs typeface="Times New Roman" panose="02020603050405020304" pitchFamily="18" charset="0"/>
-            </a:endParaRPr>
-          </a:p>
-        </p:txBody>
-      </p:sp>
-      <p:cxnSp>
-        <p:nvCxnSpPr>
-          <p:cNvPr id="151" name="直接连接符 150">
-            <a:extLst>
-              <a:ext uri="{FF2B5EF4-FFF2-40B4-BE49-F238E27FC236}">
-                <a16:creationId xmlns:a16="http://schemas.microsoft.com/office/drawing/2014/main" id="{B370BCE5-2599-495B-831D-0BA96F44A311}"/>
-              </a:ext>
-            </a:extLst>
-          </p:cNvPr>
-          <p:cNvCxnSpPr>
-            <a:cxnSpLocks/>
-          </p:cNvCxnSpPr>
-          <p:nvPr/>
-        </p:nvCxnSpPr>
-        <p:spPr>
-          <a:xfrm>
-            <a:off x="7379218" y="2135040"/>
-            <a:ext cx="0" cy="867734"/>
-          </a:xfrm>
-          <a:prstGeom prst="line">
-            <a:avLst/>
-          </a:prstGeom>
-          <a:ln w="28575">
-            <a:solidFill>
-              <a:schemeClr val="tx1"/>
-            </a:solidFill>
-            <a:prstDash val="sysDot"/>
-            <a:headEnd type="none" w="med" len="med"/>
-            <a:tailEnd type="none" w="med" len="med"/>
-          </a:ln>
-        </p:spPr>
-        <p:style>
-          <a:lnRef idx="1">
-            <a:schemeClr val="accent1"/>
-          </a:lnRef>
-          <a:fillRef idx="0">
-            <a:schemeClr val="accent1"/>
-          </a:fillRef>
-          <a:effectRef idx="0">
-            <a:schemeClr val="accent1"/>
-          </a:effectRef>
-          <a:fontRef idx="minor">
-            <a:schemeClr val="tx1"/>
-          </a:fontRef>
-        </p:style>
-      </p:cxnSp>
-      <p:sp>
-        <p:nvSpPr>
-          <p:cNvPr id="153" name="箭头: V 形 152">
-            <a:extLst>
-              <a:ext uri="{FF2B5EF4-FFF2-40B4-BE49-F238E27FC236}">
-                <a16:creationId xmlns:a16="http://schemas.microsoft.com/office/drawing/2014/main" id="{91EC59F4-D4A2-4985-8674-350C773A7D71}"/>
-              </a:ext>
-            </a:extLst>
-          </p:cNvPr>
-          <p:cNvSpPr/>
-          <p:nvPr/>
-        </p:nvSpPr>
-        <p:spPr>
-          <a:xfrm rot="16200000">
-            <a:off x="7293382" y="2123077"/>
-            <a:ext cx="171671" cy="162365"/>
-          </a:xfrm>
-          <a:prstGeom prst="chevron">
-            <a:avLst/>
-          </a:prstGeom>
-          <a:solidFill>
-            <a:schemeClr val="bg1">
-              <a:lumMod val="85000"/>
-            </a:schemeClr>
-          </a:solidFill>
-          <a:ln>
-            <a:solidFill>
-              <a:schemeClr val="tx1"/>
-            </a:solidFill>
-          </a:ln>
-        </p:spPr>
-        <p:style>
-          <a:lnRef idx="2">
-            <a:schemeClr val="accent1">
-              <a:shade val="50000"/>
-            </a:schemeClr>
-          </a:lnRef>
-          <a:fillRef idx="1">
-            <a:schemeClr val="accent1"/>
-          </a:fillRef>
-          <a:effectRef idx="0">
-            <a:schemeClr val="accent1"/>
-          </a:effectRef>
-          <a:fontRef idx="minor">
-            <a:schemeClr val="lt1"/>
-          </a:fontRef>
-        </p:style>
-        <p:txBody>
-          <a:bodyPr rot="0" spcFirstLastPara="0" vertOverflow="overflow" horzOverflow="overflow" vert="horz" wrap="square" lIns="91440" tIns="45720" rIns="91440" bIns="45720" numCol="1" spcCol="0" rtlCol="0" fromWordArt="0" anchor="ctr" anchorCtr="0" forceAA="0" compatLnSpc="1">
-            <a:prstTxWarp prst="textNoShape">
-              <a:avLst/>
-            </a:prstTxWarp>
-            <a:noAutofit/>
-          </a:bodyPr>
-          <a:lstStyle/>
-          <a:p>
-            <a:pPr algn="ctr"/>
-            <a:endParaRPr lang="zh-CN" altLang="en-US" sz="2000">
-              <a:solidFill>
-                <a:schemeClr val="tx1"/>
-              </a:solidFill>
-              <a:latin typeface="Times New Roman" panose="02020603050405020304" pitchFamily="18" charset="0"/>
-              <a:cs typeface="Times New Roman" panose="02020603050405020304" pitchFamily="18" charset="0"/>
-            </a:endParaRPr>
-          </a:p>
-        </p:txBody>
-      </p:sp>
-      <p:sp>
-        <p:nvSpPr>
-          <p:cNvPr id="154" name="箭头: V 形 153">
-            <a:extLst>
-              <a:ext uri="{FF2B5EF4-FFF2-40B4-BE49-F238E27FC236}">
-                <a16:creationId xmlns:a16="http://schemas.microsoft.com/office/drawing/2014/main" id="{0FDA09D3-EAD3-43AF-8C4F-3254B3D38C45}"/>
-              </a:ext>
-            </a:extLst>
-          </p:cNvPr>
-          <p:cNvSpPr/>
-          <p:nvPr/>
-        </p:nvSpPr>
-        <p:spPr>
-          <a:xfrm rot="5400000">
-            <a:off x="7294391" y="2900408"/>
-            <a:ext cx="171671" cy="162365"/>
-          </a:xfrm>
-          <a:prstGeom prst="chevron">
-            <a:avLst/>
-          </a:prstGeom>
-          <a:solidFill>
-            <a:schemeClr val="bg1">
-              <a:lumMod val="85000"/>
-            </a:schemeClr>
-          </a:solidFill>
-          <a:ln>
-            <a:solidFill>
-              <a:schemeClr val="tx1"/>
-            </a:solidFill>
-          </a:ln>
-        </p:spPr>
-        <p:style>
-          <a:lnRef idx="2">
-            <a:schemeClr val="accent1">
-              <a:shade val="50000"/>
-            </a:schemeClr>
-          </a:lnRef>
-          <a:fillRef idx="1">
-            <a:schemeClr val="accent1"/>
-          </a:fillRef>
-          <a:effectRef idx="0">
-            <a:schemeClr val="accent1"/>
-          </a:effectRef>
-          <a:fontRef idx="minor">
-            <a:schemeClr val="lt1"/>
-          </a:fontRef>
-        </p:style>
-        <p:txBody>
-          <a:bodyPr rot="0" spcFirstLastPara="0" vertOverflow="overflow" horzOverflow="overflow" vert="horz" wrap="square" lIns="91440" tIns="45720" rIns="91440" bIns="45720" numCol="1" spcCol="0" rtlCol="0" fromWordArt="0" anchor="ctr" anchorCtr="0" forceAA="0" compatLnSpc="1">
-            <a:prstTxWarp prst="textNoShape">
-              <a:avLst/>
-            </a:prstTxWarp>
-            <a:noAutofit/>
-          </a:bodyPr>
-          <a:lstStyle/>
-          <a:p>
-            <a:pPr algn="ctr"/>
-            <a:endParaRPr lang="zh-CN" altLang="en-US" sz="2000">
-              <a:solidFill>
-                <a:schemeClr val="tx1"/>
-              </a:solidFill>
-              <a:latin typeface="Times New Roman" panose="02020603050405020304" pitchFamily="18" charset="0"/>
-              <a:cs typeface="Times New Roman" panose="02020603050405020304" pitchFamily="18" charset="0"/>
-            </a:endParaRPr>
-          </a:p>
-        </p:txBody>
-      </p:sp>
-      <p:sp>
-        <p:nvSpPr>
-          <p:cNvPr id="155" name="箭头: V 形 154">
-            <a:extLst>
-              <a:ext uri="{FF2B5EF4-FFF2-40B4-BE49-F238E27FC236}">
-                <a16:creationId xmlns:a16="http://schemas.microsoft.com/office/drawing/2014/main" id="{63B53B7F-F1AF-475F-82A0-936E2924F53D}"/>
-              </a:ext>
-            </a:extLst>
-          </p:cNvPr>
-          <p:cNvSpPr/>
-          <p:nvPr/>
-        </p:nvSpPr>
-        <p:spPr>
-          <a:xfrm rot="5400000">
-            <a:off x="2063906" y="2885977"/>
-            <a:ext cx="171671" cy="162365"/>
-          </a:xfrm>
-          <a:prstGeom prst="chevron">
-            <a:avLst/>
-          </a:prstGeom>
-          <a:solidFill>
-            <a:schemeClr val="bg1">
-              <a:lumMod val="85000"/>
-            </a:schemeClr>
-          </a:solidFill>
-          <a:ln>
-            <a:solidFill>
-              <a:schemeClr val="tx1"/>
-            </a:solidFill>
-          </a:ln>
-        </p:spPr>
-        <p:style>
-          <a:lnRef idx="2">
-            <a:schemeClr val="accent1">
-              <a:shade val="50000"/>
-            </a:schemeClr>
-          </a:lnRef>
-          <a:fillRef idx="1">
-            <a:schemeClr val="accent1"/>
-          </a:fillRef>
-          <a:effectRef idx="0">
-            <a:schemeClr val="accent1"/>
-          </a:effectRef>
-          <a:fontRef idx="minor">
-            <a:schemeClr val="lt1"/>
-          </a:fontRef>
-        </p:style>
-        <p:txBody>
-          <a:bodyPr rot="0" spcFirstLastPara="0" vertOverflow="overflow" horzOverflow="overflow" vert="horz" wrap="square" lIns="91440" tIns="45720" rIns="91440" bIns="45720" numCol="1" spcCol="0" rtlCol="0" fromWordArt="0" anchor="ctr" anchorCtr="0" forceAA="0" compatLnSpc="1">
-            <a:prstTxWarp prst="textNoShape">
-              <a:avLst/>
-            </a:prstTxWarp>
-            <a:noAutofit/>
-          </a:bodyPr>
-          <a:lstStyle/>
-          <a:p>
-            <a:pPr algn="ctr"/>
-            <a:endParaRPr lang="zh-CN" altLang="en-US" sz="2000">
-              <a:solidFill>
-                <a:schemeClr val="tx1"/>
-              </a:solidFill>
-              <a:latin typeface="Times New Roman" panose="02020603050405020304" pitchFamily="18" charset="0"/>
-              <a:cs typeface="Times New Roman" panose="02020603050405020304" pitchFamily="18" charset="0"/>
-            </a:endParaRPr>
-          </a:p>
-        </p:txBody>
-      </p:sp>
-      <p:sp>
-        <p:nvSpPr>
-          <p:cNvPr id="157" name="箭头: V 形 156">
-            <a:extLst>
-              <a:ext uri="{FF2B5EF4-FFF2-40B4-BE49-F238E27FC236}">
-                <a16:creationId xmlns:a16="http://schemas.microsoft.com/office/drawing/2014/main" id="{90AF2F6E-E7CC-4D58-96D0-7E75EDC4BBDA}"/>
-              </a:ext>
-            </a:extLst>
-          </p:cNvPr>
-          <p:cNvSpPr/>
-          <p:nvPr/>
-        </p:nvSpPr>
-        <p:spPr>
-          <a:xfrm rot="16200000">
-            <a:off x="2063905" y="2109782"/>
-            <a:ext cx="171671" cy="162365"/>
-          </a:xfrm>
-          <a:prstGeom prst="chevron">
-            <a:avLst/>
-          </a:prstGeom>
-          <a:solidFill>
-            <a:schemeClr val="bg1">
-              <a:lumMod val="85000"/>
-            </a:schemeClr>
-          </a:solidFill>
-          <a:ln>
-            <a:solidFill>
-              <a:schemeClr val="tx1"/>
-            </a:solidFill>
-          </a:ln>
-        </p:spPr>
-        <p:style>
-          <a:lnRef idx="2">
-            <a:schemeClr val="accent1">
-              <a:shade val="50000"/>
-            </a:schemeClr>
-          </a:lnRef>
-          <a:fillRef idx="1">
-            <a:schemeClr val="accent1"/>
-          </a:fillRef>
-          <a:effectRef idx="0">
-            <a:schemeClr val="accent1"/>
-          </a:effectRef>
-          <a:fontRef idx="minor">
-            <a:schemeClr val="lt1"/>
-          </a:fontRef>
-        </p:style>
-        <p:txBody>
-          <a:bodyPr rot="0" spcFirstLastPara="0" vertOverflow="overflow" horzOverflow="overflow" vert="horz" wrap="square" lIns="91440" tIns="45720" rIns="91440" bIns="45720" numCol="1" spcCol="0" rtlCol="0" fromWordArt="0" anchor="ctr" anchorCtr="0" forceAA="0" compatLnSpc="1">
-            <a:prstTxWarp prst="textNoShape">
-              <a:avLst/>
-            </a:prstTxWarp>
-            <a:noAutofit/>
-          </a:bodyPr>
-          <a:lstStyle/>
-          <a:p>
-            <a:pPr algn="ctr"/>
-            <a:endParaRPr lang="zh-CN" altLang="en-US" sz="2000">
-              <a:solidFill>
-                <a:schemeClr val="tx1"/>
-              </a:solidFill>
-              <a:latin typeface="Times New Roman" panose="02020603050405020304" pitchFamily="18" charset="0"/>
-              <a:cs typeface="Times New Roman" panose="02020603050405020304" pitchFamily="18" charset="0"/>
-            </a:endParaRPr>
-          </a:p>
-        </p:txBody>
-      </p:sp>
-      <p:cxnSp>
-        <p:nvCxnSpPr>
-          <p:cNvPr id="158" name="直接连接符 157">
-            <a:extLst>
-              <a:ext uri="{FF2B5EF4-FFF2-40B4-BE49-F238E27FC236}">
-                <a16:creationId xmlns:a16="http://schemas.microsoft.com/office/drawing/2014/main" id="{890D5C19-B165-4610-B61E-15555CAEC7B8}"/>
-              </a:ext>
-            </a:extLst>
-          </p:cNvPr>
-          <p:cNvCxnSpPr>
-            <a:cxnSpLocks/>
-          </p:cNvCxnSpPr>
-          <p:nvPr/>
-        </p:nvCxnSpPr>
-        <p:spPr>
-          <a:xfrm flipV="1">
-            <a:off x="7393193" y="4600877"/>
-            <a:ext cx="0" cy="313510"/>
-          </a:xfrm>
-          <a:prstGeom prst="line">
-            <a:avLst/>
-          </a:prstGeom>
-          <a:ln w="19050">
-            <a:solidFill>
-              <a:schemeClr val="tx1"/>
-            </a:solidFill>
-            <a:prstDash val="solid"/>
-            <a:headEnd type="arrow" w="med" len="med"/>
-            <a:tailEnd type="arrow" w="med" len="med"/>
-          </a:ln>
-        </p:spPr>
-        <p:style>
-          <a:lnRef idx="1">
-            <a:schemeClr val="accent1"/>
-          </a:lnRef>
-          <a:fillRef idx="0">
-            <a:schemeClr val="accent1"/>
-          </a:fillRef>
-          <a:effectRef idx="0">
-            <a:schemeClr val="accent1"/>
-          </a:effectRef>
-          <a:fontRef idx="minor">
-            <a:schemeClr val="tx1"/>
-          </a:fontRef>
-        </p:style>
-      </p:cxnSp>
-      <p:sp>
-        <p:nvSpPr>
-          <p:cNvPr id="159" name="矩形: 圆角 158">
-            <a:extLst>
-              <a:ext uri="{FF2B5EF4-FFF2-40B4-BE49-F238E27FC236}">
-                <a16:creationId xmlns:a16="http://schemas.microsoft.com/office/drawing/2014/main" id="{AA616D19-5FCD-4D6E-84D9-CCA09D7B969B}"/>
-              </a:ext>
-            </a:extLst>
-          </p:cNvPr>
-          <p:cNvSpPr/>
-          <p:nvPr/>
-        </p:nvSpPr>
-        <p:spPr>
-          <a:xfrm>
-            <a:off x="9522633" y="4025943"/>
-            <a:ext cx="1642368" cy="568765"/>
-          </a:xfrm>
-          <a:prstGeom prst="roundRect">
-            <a:avLst/>
-          </a:prstGeom>
-          <a:solidFill>
-            <a:schemeClr val="bg1">
-              <a:lumMod val="85000"/>
-            </a:schemeClr>
-          </a:solidFill>
-          <a:ln>
-            <a:solidFill>
-              <a:schemeClr val="tx1"/>
-            </a:solidFill>
-          </a:ln>
-        </p:spPr>
-        <p:style>
-          <a:lnRef idx="2">
-            <a:schemeClr val="accent1">
-              <a:shade val="50000"/>
-            </a:schemeClr>
-          </a:lnRef>
-          <a:fillRef idx="1">
-            <a:schemeClr val="accent1"/>
-          </a:fillRef>
-          <a:effectRef idx="0">
-            <a:schemeClr val="accent1"/>
-          </a:effectRef>
-          <a:fontRef idx="minor">
-            <a:schemeClr val="lt1"/>
-          </a:fontRef>
-        </p:style>
-        <p:txBody>
-          <a:bodyPr rtlCol="0" anchor="ctr"/>
-          <a:lstStyle/>
-          <a:p>
-            <a:pPr algn="ctr"/>
-            <a:r>
-              <a:rPr lang="en-US" altLang="zh-CN" sz="2000" dirty="0">
-                <a:solidFill>
-                  <a:schemeClr val="tx1"/>
-                </a:solidFill>
-                <a:latin typeface="Times New Roman" panose="02020603050405020304" pitchFamily="18" charset="0"/>
-                <a:cs typeface="Times New Roman" panose="02020603050405020304" pitchFamily="18" charset="0"/>
-              </a:rPr>
-              <a:t>Host Cycler</a:t>
-            </a:r>
-            <a:endParaRPr lang="zh-CN" altLang="en-US" sz="2000" dirty="0">
-              <a:solidFill>
-                <a:schemeClr val="tx1"/>
-              </a:solidFill>
-              <a:latin typeface="Times New Roman" panose="02020603050405020304" pitchFamily="18" charset="0"/>
-              <a:cs typeface="Times New Roman" panose="02020603050405020304" pitchFamily="18" charset="0"/>
-            </a:endParaRPr>
-          </a:p>
-        </p:txBody>
-      </p:sp>
-      <p:cxnSp>
-        <p:nvCxnSpPr>
-          <p:cNvPr id="160" name="直接连接符 159">
-            <a:extLst>
-              <a:ext uri="{FF2B5EF4-FFF2-40B4-BE49-F238E27FC236}">
-                <a16:creationId xmlns:a16="http://schemas.microsoft.com/office/drawing/2014/main" id="{7FAEE5DC-989F-4270-BCC4-48F6F7026190}"/>
-              </a:ext>
-            </a:extLst>
-          </p:cNvPr>
-          <p:cNvCxnSpPr>
-            <a:cxnSpLocks/>
-            <a:stCxn id="135" idx="0"/>
-            <a:endCxn id="159" idx="2"/>
-          </p:cNvCxnSpPr>
-          <p:nvPr/>
-        </p:nvCxnSpPr>
-        <p:spPr>
-          <a:xfrm flipV="1">
-            <a:off x="10339929" y="4594708"/>
-            <a:ext cx="3888" cy="296978"/>
-          </a:xfrm>
-          <a:prstGeom prst="line">
-            <a:avLst/>
-          </a:prstGeom>
-          <a:ln w="19050">
-            <a:solidFill>
-              <a:schemeClr val="tx1"/>
-            </a:solidFill>
-            <a:prstDash val="solid"/>
-            <a:headEnd type="arrow" w="med" len="med"/>
-            <a:tailEnd type="arrow" w="med" len="med"/>
-          </a:ln>
-        </p:spPr>
-        <p:style>
-          <a:lnRef idx="1">
-            <a:schemeClr val="accent1"/>
-          </a:lnRef>
-          <a:fillRef idx="0">
-            <a:schemeClr val="accent1"/>
-          </a:fillRef>
-          <a:effectRef idx="0">
-            <a:schemeClr val="accent1"/>
-          </a:effectRef>
-          <a:fontRef idx="minor">
-            <a:schemeClr val="tx1"/>
-          </a:fontRef>
-        </p:style>
-      </p:cxnSp>
-      <p:sp>
-        <p:nvSpPr>
-          <p:cNvPr id="163" name="矩形: 圆角 162">
-            <a:extLst>
-              <a:ext uri="{FF2B5EF4-FFF2-40B4-BE49-F238E27FC236}">
-                <a16:creationId xmlns:a16="http://schemas.microsoft.com/office/drawing/2014/main" id="{D24DC065-C1EE-48E5-9536-0BF6233DC14A}"/>
-              </a:ext>
-            </a:extLst>
-          </p:cNvPr>
-          <p:cNvSpPr/>
-          <p:nvPr/>
-        </p:nvSpPr>
-        <p:spPr>
-          <a:xfrm>
-            <a:off x="9513397" y="2981590"/>
-            <a:ext cx="1642368" cy="568765"/>
-          </a:xfrm>
-          <a:prstGeom prst="roundRect">
-            <a:avLst/>
-          </a:prstGeom>
-          <a:solidFill>
-            <a:schemeClr val="bg1">
-              <a:lumMod val="85000"/>
-            </a:schemeClr>
-          </a:solidFill>
-          <a:ln>
-            <a:solidFill>
-              <a:schemeClr val="tx1"/>
-            </a:solidFill>
-          </a:ln>
-        </p:spPr>
-        <p:style>
-          <a:lnRef idx="2">
-            <a:schemeClr val="accent1">
-              <a:shade val="50000"/>
-            </a:schemeClr>
-          </a:lnRef>
-          <a:fillRef idx="1">
-            <a:schemeClr val="accent1"/>
-          </a:fillRef>
-          <a:effectRef idx="0">
-            <a:schemeClr val="accent1"/>
-          </a:effectRef>
-          <a:fontRef idx="minor">
-            <a:schemeClr val="lt1"/>
-          </a:fontRef>
-        </p:style>
-        <p:txBody>
-          <a:bodyPr rtlCol="0" anchor="ctr"/>
-          <a:lstStyle/>
-          <a:p>
-            <a:pPr algn="ctr"/>
-            <a:r>
-              <a:rPr lang="en-US" altLang="zh-CN" sz="2000" dirty="0">
-                <a:solidFill>
-                  <a:schemeClr val="tx1"/>
-                </a:solidFill>
-                <a:latin typeface="Times New Roman" panose="02020603050405020304" pitchFamily="18" charset="0"/>
-                <a:cs typeface="Times New Roman" panose="02020603050405020304" pitchFamily="18" charset="0"/>
-              </a:rPr>
-              <a:t>Daemon</a:t>
-            </a:r>
-            <a:endParaRPr lang="zh-CN" altLang="en-US" sz="2000" dirty="0">
-              <a:solidFill>
-                <a:schemeClr val="tx1"/>
-              </a:solidFill>
-              <a:latin typeface="Times New Roman" panose="02020603050405020304" pitchFamily="18" charset="0"/>
-              <a:cs typeface="Times New Roman" panose="02020603050405020304" pitchFamily="18" charset="0"/>
-            </a:endParaRPr>
-          </a:p>
-        </p:txBody>
-      </p:sp>
-      <p:cxnSp>
-        <p:nvCxnSpPr>
-          <p:cNvPr id="164" name="直接连接符 163">
-            <a:extLst>
-              <a:ext uri="{FF2B5EF4-FFF2-40B4-BE49-F238E27FC236}">
-                <a16:creationId xmlns:a16="http://schemas.microsoft.com/office/drawing/2014/main" id="{D8F3194E-6187-4EE0-B121-60848A84A5CE}"/>
-              </a:ext>
-            </a:extLst>
-          </p:cNvPr>
-          <p:cNvCxnSpPr>
-            <a:cxnSpLocks/>
-            <a:stCxn id="159" idx="1"/>
-            <a:endCxn id="150" idx="3"/>
-          </p:cNvCxnSpPr>
-          <p:nvPr/>
-        </p:nvCxnSpPr>
-        <p:spPr>
-          <a:xfrm flipH="1">
-            <a:off x="8200402" y="4310326"/>
-            <a:ext cx="1322231" cy="902"/>
-          </a:xfrm>
-          <a:prstGeom prst="line">
-            <a:avLst/>
-          </a:prstGeom>
-          <a:ln w="19050">
-            <a:solidFill>
-              <a:schemeClr val="tx1"/>
-            </a:solidFill>
-            <a:prstDash val="solid"/>
-            <a:headEnd type="none" w="med" len="med"/>
-            <a:tailEnd type="none" w="med" len="med"/>
-          </a:ln>
-        </p:spPr>
-        <p:style>
-          <a:lnRef idx="1">
-            <a:schemeClr val="accent1"/>
-          </a:lnRef>
-          <a:fillRef idx="0">
-            <a:schemeClr val="accent1"/>
-          </a:fillRef>
-          <a:effectRef idx="0">
-            <a:schemeClr val="accent1"/>
-          </a:effectRef>
-          <a:fontRef idx="minor">
-            <a:schemeClr val="tx1"/>
-          </a:fontRef>
-        </p:style>
-      </p:cxnSp>
-      <p:cxnSp>
-        <p:nvCxnSpPr>
-          <p:cNvPr id="168" name="连接符: 肘形 167">
-            <a:extLst>
-              <a:ext uri="{FF2B5EF4-FFF2-40B4-BE49-F238E27FC236}">
-                <a16:creationId xmlns:a16="http://schemas.microsoft.com/office/drawing/2014/main" id="{488A72D3-C1D0-49BC-A7BD-E12910D2562D}"/>
-              </a:ext>
-            </a:extLst>
-          </p:cNvPr>
-          <p:cNvCxnSpPr>
-            <a:cxnSpLocks/>
-            <a:stCxn id="170" idx="0"/>
-            <a:endCxn id="163" idx="2"/>
-          </p:cNvCxnSpPr>
-          <p:nvPr/>
-        </p:nvCxnSpPr>
-        <p:spPr>
-          <a:xfrm rot="5400000" flipH="1" flipV="1">
-            <a:off x="9215022" y="3197007"/>
-            <a:ext cx="766210" cy="1472907"/>
-          </a:xfrm>
-          <a:prstGeom prst="bentConnector3">
-            <a:avLst>
-              <a:gd name="adj1" fmla="val 57233"/>
-            </a:avLst>
-          </a:prstGeom>
-          <a:ln w="19050">
-            <a:solidFill>
-              <a:schemeClr val="tx1"/>
-            </a:solidFill>
-            <a:prstDash val="solid"/>
-            <a:headEnd type="none" w="med" len="med"/>
-            <a:tailEnd type="arrow" w="med" len="med"/>
-          </a:ln>
-        </p:spPr>
-        <p:style>
-          <a:lnRef idx="1">
-            <a:schemeClr val="accent1"/>
-          </a:lnRef>
-          <a:fillRef idx="0">
-            <a:schemeClr val="accent1"/>
-          </a:fillRef>
-          <a:effectRef idx="0">
-            <a:schemeClr val="accent1"/>
-          </a:effectRef>
-          <a:fontRef idx="minor">
-            <a:schemeClr val="tx1"/>
-          </a:fontRef>
-        </p:style>
-      </p:cxnSp>
-      <p:sp>
-        <p:nvSpPr>
-          <p:cNvPr id="170" name="等腰三角形 169">
-            <a:extLst>
-              <a:ext uri="{FF2B5EF4-FFF2-40B4-BE49-F238E27FC236}">
-                <a16:creationId xmlns:a16="http://schemas.microsoft.com/office/drawing/2014/main" id="{0AFAB4CD-1C9B-4292-8F4B-8249ECB8DF96}"/>
-              </a:ext>
-            </a:extLst>
-          </p:cNvPr>
-          <p:cNvSpPr/>
-          <p:nvPr/>
-        </p:nvSpPr>
-        <p:spPr>
-          <a:xfrm>
-            <a:off x="8730377" y="4316565"/>
-            <a:ext cx="262593" cy="296978"/>
-          </a:xfrm>
-          <a:prstGeom prst="triangle">
-            <a:avLst/>
-          </a:prstGeom>
-          <a:noFill/>
-          <a:ln>
-            <a:noFill/>
-          </a:ln>
-        </p:spPr>
-        <p:style>
-          <a:lnRef idx="2">
-            <a:schemeClr val="accent1">
-              <a:shade val="50000"/>
-            </a:schemeClr>
-          </a:lnRef>
-          <a:fillRef idx="1">
-            <a:schemeClr val="accent1"/>
-          </a:fillRef>
-          <a:effectRef idx="0">
-            <a:schemeClr val="accent1"/>
-          </a:effectRef>
-          <a:fontRef idx="minor">
-            <a:schemeClr val="lt1"/>
-          </a:fontRef>
-        </p:style>
-        <p:txBody>
-          <a:bodyPr rtlCol="0" anchor="ctr"/>
-          <a:lstStyle/>
-          <a:p>
-            <a:pPr algn="ctr"/>
-            <a:endParaRPr lang="zh-CN" altLang="en-US"/>
-          </a:p>
-        </p:txBody>
-      </p:sp>
-      <p:cxnSp>
-        <p:nvCxnSpPr>
-          <p:cNvPr id="174" name="直接连接符 173">
-            <a:extLst>
-              <a:ext uri="{FF2B5EF4-FFF2-40B4-BE49-F238E27FC236}">
-                <a16:creationId xmlns:a16="http://schemas.microsoft.com/office/drawing/2014/main" id="{00DB529F-06D9-4C50-85AC-4F8D2909B9B1}"/>
-              </a:ext>
-            </a:extLst>
-          </p:cNvPr>
-          <p:cNvCxnSpPr>
-            <a:cxnSpLocks/>
-            <a:stCxn id="163" idx="1"/>
-            <a:endCxn id="133" idx="3"/>
-          </p:cNvCxnSpPr>
-          <p:nvPr/>
-        </p:nvCxnSpPr>
-        <p:spPr>
-          <a:xfrm flipH="1">
-            <a:off x="8200403" y="3265973"/>
-            <a:ext cx="1312994" cy="1370"/>
-          </a:xfrm>
-          <a:prstGeom prst="line">
-            <a:avLst/>
-          </a:prstGeom>
-          <a:ln w="19050">
-            <a:solidFill>
-              <a:schemeClr val="tx1"/>
-            </a:solidFill>
-            <a:prstDash val="solid"/>
-            <a:headEnd type="none" w="med" len="med"/>
-            <a:tailEnd type="arrow" w="med" len="med"/>
-          </a:ln>
-        </p:spPr>
-        <p:style>
-          <a:lnRef idx="1">
-            <a:schemeClr val="accent1"/>
-          </a:lnRef>
-          <a:fillRef idx="0">
-            <a:schemeClr val="accent1"/>
-          </a:fillRef>
-          <a:effectRef idx="0">
-            <a:schemeClr val="accent1"/>
-          </a:effectRef>
-          <a:fontRef idx="minor">
-            <a:schemeClr val="tx1"/>
-          </a:fontRef>
-        </p:style>
-      </p:cxnSp>
-      <p:sp>
-        <p:nvSpPr>
-          <p:cNvPr id="182" name="矩形 181">
-            <a:extLst>
-              <a:ext uri="{FF2B5EF4-FFF2-40B4-BE49-F238E27FC236}">
-                <a16:creationId xmlns:a16="http://schemas.microsoft.com/office/drawing/2014/main" id="{54B98A17-127E-4B18-AF50-689B2B6C2258}"/>
-              </a:ext>
-            </a:extLst>
-          </p:cNvPr>
-          <p:cNvSpPr/>
-          <p:nvPr/>
-        </p:nvSpPr>
-        <p:spPr>
-          <a:xfrm>
-            <a:off x="6313474" y="2527907"/>
-            <a:ext cx="1265106" cy="317381"/>
-          </a:xfrm>
-          <a:prstGeom prst="rect">
-            <a:avLst/>
-          </a:prstGeom>
-          <a:solidFill>
-            <a:schemeClr val="bg1"/>
-          </a:solidFill>
-          <a:ln>
-            <a:solidFill>
-              <a:schemeClr val="tx1"/>
-            </a:solidFill>
-          </a:ln>
-        </p:spPr>
-        <p:style>
-          <a:lnRef idx="2">
-            <a:schemeClr val="accent1">
-              <a:shade val="50000"/>
-            </a:schemeClr>
-          </a:lnRef>
-          <a:fillRef idx="1">
-            <a:schemeClr val="accent1"/>
-          </a:fillRef>
-          <a:effectRef idx="0">
-            <a:schemeClr val="accent1"/>
-          </a:effectRef>
-          <a:fontRef idx="minor">
-            <a:schemeClr val="lt1"/>
-          </a:fontRef>
-        </p:style>
-        <p:txBody>
-          <a:bodyPr rtlCol="0" anchor="ctr"/>
-          <a:lstStyle/>
-          <a:p>
-            <a:pPr algn="ctr"/>
-            <a:endParaRPr lang="zh-CN" altLang="en-US"/>
-          </a:p>
-        </p:txBody>
-      </p:sp>
-      <p:sp>
-        <p:nvSpPr>
-          <p:cNvPr id="183" name="文本框 182">
-            <a:extLst>
-              <a:ext uri="{FF2B5EF4-FFF2-40B4-BE49-F238E27FC236}">
-                <a16:creationId xmlns:a16="http://schemas.microsoft.com/office/drawing/2014/main" id="{72049BE5-E4AD-432D-A321-48FA501EF4A1}"/>
-              </a:ext>
-            </a:extLst>
-          </p:cNvPr>
-          <p:cNvSpPr txBox="1"/>
-          <p:nvPr/>
-        </p:nvSpPr>
-        <p:spPr>
-          <a:xfrm>
-            <a:off x="6172605" y="2494251"/>
-            <a:ext cx="1577385" cy="369332"/>
-          </a:xfrm>
-          <a:prstGeom prst="rect">
-            <a:avLst/>
-          </a:prstGeom>
-          <a:noFill/>
-        </p:spPr>
-        <p:txBody>
-          <a:bodyPr wrap="square" rtlCol="0">
-            <a:spAutoFit/>
-          </a:bodyPr>
-          <a:lstStyle/>
-          <a:p>
-            <a:pPr algn="ctr"/>
-            <a:r>
-              <a:rPr lang="en-US" altLang="zh-CN" dirty="0">
-                <a:solidFill>
-                  <a:schemeClr val="accent2"/>
-                </a:solidFill>
-                <a:latin typeface="Times New Roman" panose="02020603050405020304" pitchFamily="18" charset="0"/>
-                <a:cs typeface="Times New Roman" panose="02020603050405020304" pitchFamily="18" charset="0"/>
-              </a:rPr>
-              <a:t>{states, Json}</a:t>
-            </a:r>
-            <a:endParaRPr lang="zh-CN" altLang="en-US" dirty="0">
-              <a:solidFill>
-                <a:schemeClr val="accent2"/>
-              </a:solidFill>
-              <a:latin typeface="Times New Roman" panose="02020603050405020304" pitchFamily="18" charset="0"/>
-              <a:cs typeface="Times New Roman" panose="02020603050405020304" pitchFamily="18" charset="0"/>
-            </a:endParaRPr>
-          </a:p>
-        </p:txBody>
-      </p:sp>
-      <p:sp>
-        <p:nvSpPr>
-          <p:cNvPr id="186" name="文本框 185">
-            <a:extLst>
-              <a:ext uri="{FF2B5EF4-FFF2-40B4-BE49-F238E27FC236}">
-                <a16:creationId xmlns:a16="http://schemas.microsoft.com/office/drawing/2014/main" id="{D6F9ADD3-9500-4F54-B6FB-6684BD6A3291}"/>
-              </a:ext>
-            </a:extLst>
-          </p:cNvPr>
-          <p:cNvSpPr txBox="1"/>
-          <p:nvPr/>
-        </p:nvSpPr>
-        <p:spPr>
-          <a:xfrm>
-            <a:off x="8687920" y="471339"/>
-            <a:ext cx="2581922" cy="369332"/>
-          </a:xfrm>
-          <a:prstGeom prst="rect">
-            <a:avLst/>
-          </a:prstGeom>
-          <a:noFill/>
-        </p:spPr>
-        <p:txBody>
-          <a:bodyPr wrap="square" rtlCol="0">
-            <a:spAutoFit/>
-          </a:bodyPr>
-          <a:lstStyle/>
-          <a:p>
-            <a:pPr algn="ctr"/>
-            <a:r>
-              <a:rPr lang="en-US" altLang="zh-CN" dirty="0">
-                <a:latin typeface="Times New Roman" panose="02020603050405020304" pitchFamily="18" charset="0"/>
-                <a:cs typeface="Times New Roman" panose="02020603050405020304" pitchFamily="18" charset="0"/>
-              </a:rPr>
-              <a:t>Client API</a:t>
-            </a:r>
-            <a:endParaRPr lang="zh-CN" altLang="en-US" dirty="0">
-              <a:latin typeface="Times New Roman" panose="02020603050405020304" pitchFamily="18" charset="0"/>
-              <a:cs typeface="Times New Roman" panose="02020603050405020304" pitchFamily="18" charset="0"/>
-            </a:endParaRPr>
-          </a:p>
-        </p:txBody>
-      </p:sp>
-      <p:sp>
-        <p:nvSpPr>
-          <p:cNvPr id="187" name="流程图: 卡片 186">
-            <a:extLst>
-              <a:ext uri="{FF2B5EF4-FFF2-40B4-BE49-F238E27FC236}">
-                <a16:creationId xmlns:a16="http://schemas.microsoft.com/office/drawing/2014/main" id="{507A7306-5D47-42BE-87BD-B7215217F6E7}"/>
-              </a:ext>
-            </a:extLst>
-          </p:cNvPr>
-          <p:cNvSpPr/>
-          <p:nvPr/>
-        </p:nvSpPr>
-        <p:spPr>
-          <a:xfrm>
-            <a:off x="9095554" y="855092"/>
-            <a:ext cx="1766655" cy="628073"/>
-          </a:xfrm>
-          <a:prstGeom prst="flowChartPunchedCard">
-            <a:avLst/>
-          </a:prstGeom>
-          <a:solidFill>
-            <a:schemeClr val="bg1">
-              <a:lumMod val="85000"/>
-            </a:schemeClr>
-          </a:solidFill>
-          <a:ln w="19050">
-            <a:solidFill>
-              <a:schemeClr val="tx1"/>
-            </a:solidFill>
-          </a:ln>
-        </p:spPr>
-        <p:style>
-          <a:lnRef idx="2">
-            <a:schemeClr val="accent1">
-              <a:shade val="50000"/>
-            </a:schemeClr>
-          </a:lnRef>
-          <a:fillRef idx="1">
-            <a:schemeClr val="accent1"/>
-          </a:fillRef>
-          <a:effectRef idx="0">
-            <a:schemeClr val="accent1"/>
-          </a:effectRef>
-          <a:fontRef idx="minor">
-            <a:schemeClr val="lt1"/>
-          </a:fontRef>
-        </p:style>
-        <p:txBody>
-          <a:bodyPr rot="0" spcFirstLastPara="0" vertOverflow="overflow" horzOverflow="overflow" vert="horz" wrap="square" lIns="91440" tIns="45720" rIns="91440" bIns="45720" numCol="1" spcCol="0" rtlCol="0" fromWordArt="0" anchor="ctr" anchorCtr="0" forceAA="0" compatLnSpc="1">
-            <a:prstTxWarp prst="textNoShape">
-              <a:avLst/>
-            </a:prstTxWarp>
-            <a:noAutofit/>
-          </a:bodyPr>
-          <a:lstStyle/>
-          <a:p>
-            <a:pPr algn="ctr"/>
-            <a:endParaRPr lang="zh-CN" altLang="en-US" sz="1600" i="1" dirty="0">
-              <a:solidFill>
-                <a:schemeClr val="accent2"/>
-              </a:solidFill>
-              <a:latin typeface="Times New Roman" panose="02020603050405020304" pitchFamily="18" charset="0"/>
-              <a:cs typeface="Times New Roman" panose="02020603050405020304" pitchFamily="18" charset="0"/>
-            </a:endParaRPr>
-          </a:p>
-        </p:txBody>
-      </p:sp>
-      <p:sp>
-        <p:nvSpPr>
-          <p:cNvPr id="189" name="矩形 188">
-            <a:extLst>
-              <a:ext uri="{FF2B5EF4-FFF2-40B4-BE49-F238E27FC236}">
-                <a16:creationId xmlns:a16="http://schemas.microsoft.com/office/drawing/2014/main" id="{B19B9F03-E288-4F3A-B07A-8BF3181719D3}"/>
-              </a:ext>
-            </a:extLst>
-          </p:cNvPr>
-          <p:cNvSpPr/>
-          <p:nvPr/>
-        </p:nvSpPr>
-        <p:spPr>
-          <a:xfrm>
-            <a:off x="1005702" y="916037"/>
-            <a:ext cx="1719125" cy="584775"/>
-          </a:xfrm>
-          <a:prstGeom prst="rect">
-            <a:avLst/>
-          </a:prstGeom>
-        </p:spPr>
-        <p:txBody>
-          <a:bodyPr wrap="none">
-            <a:spAutoFit/>
-          </a:bodyPr>
-          <a:lstStyle/>
-          <a:p>
-            <a:pPr algn="ctr"/>
-            <a:r>
-              <a:rPr lang="en-US" altLang="zh-CN" sz="1600" i="1" dirty="0" err="1">
-                <a:latin typeface="Times New Roman" panose="02020603050405020304" pitchFamily="18" charset="0"/>
-                <a:cs typeface="Times New Roman" panose="02020603050405020304" pitchFamily="18" charset="0"/>
-              </a:rPr>
-              <a:t>createAndStartVM</a:t>
-            </a:r>
-            <a:endParaRPr lang="en-US" altLang="zh-CN" sz="1600" i="1" dirty="0">
-              <a:latin typeface="Times New Roman" panose="02020603050405020304" pitchFamily="18" charset="0"/>
-              <a:cs typeface="Times New Roman" panose="02020603050405020304" pitchFamily="18" charset="0"/>
-            </a:endParaRPr>
-          </a:p>
-          <a:p>
-            <a:pPr algn="ctr"/>
-            <a:r>
-              <a:rPr lang="en-US" altLang="zh-CN" sz="1600" dirty="0">
-                <a:solidFill>
-                  <a:schemeClr val="accent2"/>
-                </a:solidFill>
-                <a:latin typeface="Times New Roman" panose="02020603050405020304" pitchFamily="18" charset="0"/>
-                <a:cs typeface="Times New Roman" panose="02020603050405020304" pitchFamily="18" charset="0"/>
-              </a:rPr>
-              <a:t>(YAML)</a:t>
-            </a:r>
-            <a:endParaRPr lang="zh-CN" altLang="en-US" sz="1600" i="1" dirty="0">
-              <a:solidFill>
-                <a:schemeClr val="accent2"/>
-              </a:solidFill>
-              <a:latin typeface="Times New Roman" panose="02020603050405020304" pitchFamily="18" charset="0"/>
-              <a:cs typeface="Times New Roman" panose="02020603050405020304" pitchFamily="18" charset="0"/>
-            </a:endParaRPr>
-          </a:p>
-        </p:txBody>
-      </p:sp>
-      <p:sp>
-        <p:nvSpPr>
-          <p:cNvPr id="197" name="矩形 196">
-            <a:extLst>
-              <a:ext uri="{FF2B5EF4-FFF2-40B4-BE49-F238E27FC236}">
-                <a16:creationId xmlns:a16="http://schemas.microsoft.com/office/drawing/2014/main" id="{8CF0CB78-4312-41E1-A54B-04EAF0F3650B}"/>
-              </a:ext>
-            </a:extLst>
-          </p:cNvPr>
-          <p:cNvSpPr/>
-          <p:nvPr/>
-        </p:nvSpPr>
-        <p:spPr>
-          <a:xfrm>
-            <a:off x="1006995" y="3604211"/>
-            <a:ext cx="1041733" cy="366733"/>
-          </a:xfrm>
-          <a:prstGeom prst="rect">
-            <a:avLst/>
-          </a:prstGeom>
-          <a:solidFill>
-            <a:schemeClr val="bg1"/>
-          </a:solidFill>
-          <a:ln>
-            <a:solidFill>
-              <a:schemeClr val="tx1"/>
-            </a:solidFill>
-          </a:ln>
-        </p:spPr>
-        <p:style>
-          <a:lnRef idx="2">
-            <a:schemeClr val="accent1">
-              <a:shade val="50000"/>
-            </a:schemeClr>
-          </a:lnRef>
-          <a:fillRef idx="1">
-            <a:schemeClr val="accent1"/>
-          </a:fillRef>
-          <a:effectRef idx="0">
-            <a:schemeClr val="accent1"/>
-          </a:effectRef>
-          <a:fontRef idx="minor">
-            <a:schemeClr val="lt1"/>
-          </a:fontRef>
-        </p:style>
-        <p:txBody>
-          <a:bodyPr rtlCol="0" anchor="ctr"/>
-          <a:lstStyle/>
-          <a:p>
-            <a:pPr algn="ctr"/>
-            <a:endParaRPr lang="zh-CN" altLang="en-US"/>
-          </a:p>
-        </p:txBody>
-      </p:sp>
-      <p:sp>
-        <p:nvSpPr>
-          <p:cNvPr id="198" name="矩形 197">
-            <a:extLst>
-              <a:ext uri="{FF2B5EF4-FFF2-40B4-BE49-F238E27FC236}">
-                <a16:creationId xmlns:a16="http://schemas.microsoft.com/office/drawing/2014/main" id="{75E0CD38-350B-4D16-AC07-8A9CFC2AE0EA}"/>
-              </a:ext>
-            </a:extLst>
-          </p:cNvPr>
-          <p:cNvSpPr/>
-          <p:nvPr/>
-        </p:nvSpPr>
-        <p:spPr>
-          <a:xfrm>
-            <a:off x="872982" y="3603197"/>
-            <a:ext cx="1350946" cy="403765"/>
-          </a:xfrm>
-          <a:prstGeom prst="rect">
-            <a:avLst/>
-          </a:prstGeom>
-        </p:spPr>
-        <p:txBody>
-          <a:bodyPr wrap="square">
-            <a:spAutoFit/>
-          </a:bodyPr>
-          <a:lstStyle/>
-          <a:p>
-            <a:pPr algn="ctr">
-              <a:lnSpc>
-                <a:spcPts val="1200"/>
-              </a:lnSpc>
-            </a:pPr>
-            <a:r>
-              <a:rPr lang="en-US" altLang="zh-CN" sz="1400" i="1" dirty="0">
-                <a:latin typeface="Times New Roman" panose="02020603050405020304" pitchFamily="18" charset="0"/>
-                <a:cs typeface="Times New Roman" panose="02020603050405020304" pitchFamily="18" charset="0"/>
-              </a:rPr>
-              <a:t>Operation</a:t>
-            </a:r>
-            <a:r>
-              <a:rPr lang="en-US" altLang="zh-CN" sz="1400" dirty="0">
-                <a:latin typeface="Times New Roman" panose="02020603050405020304" pitchFamily="18" charset="0"/>
-                <a:cs typeface="Times New Roman" panose="02020603050405020304" pitchFamily="18" charset="0"/>
-              </a:rPr>
-              <a:t>:</a:t>
-            </a:r>
-          </a:p>
-          <a:p>
-            <a:pPr algn="ctr">
-              <a:lnSpc>
-                <a:spcPts val="1200"/>
-              </a:lnSpc>
-            </a:pPr>
-            <a:r>
-              <a:rPr lang="en-US" altLang="zh-CN" sz="1400" dirty="0">
-                <a:solidFill>
-                  <a:schemeClr val="accent2"/>
-                </a:solidFill>
-                <a:latin typeface="Times New Roman" panose="02020603050405020304" pitchFamily="18" charset="0"/>
-                <a:cs typeface="Times New Roman" panose="02020603050405020304" pitchFamily="18" charset="0"/>
-              </a:rPr>
-              <a:t>(ADDED)</a:t>
-            </a:r>
-            <a:endParaRPr lang="zh-CN" altLang="en-US" sz="1400" dirty="0">
-              <a:solidFill>
-                <a:schemeClr val="accent2"/>
-              </a:solidFill>
-              <a:latin typeface="Times New Roman" panose="02020603050405020304" pitchFamily="18" charset="0"/>
-              <a:cs typeface="Times New Roman" panose="02020603050405020304" pitchFamily="18" charset="0"/>
-            </a:endParaRPr>
-          </a:p>
-        </p:txBody>
-      </p:sp>
-      <p:cxnSp>
-        <p:nvCxnSpPr>
-          <p:cNvPr id="199" name="直接连接符 198">
-            <a:extLst>
-              <a:ext uri="{FF2B5EF4-FFF2-40B4-BE49-F238E27FC236}">
-                <a16:creationId xmlns:a16="http://schemas.microsoft.com/office/drawing/2014/main" id="{2123D9E3-61DF-4D37-86B7-2E55176CA561}"/>
-              </a:ext>
-            </a:extLst>
-          </p:cNvPr>
-          <p:cNvCxnSpPr>
-            <a:cxnSpLocks/>
-            <a:endCxn id="187" idx="2"/>
-          </p:cNvCxnSpPr>
-          <p:nvPr/>
-        </p:nvCxnSpPr>
-        <p:spPr>
-          <a:xfrm flipV="1">
-            <a:off x="9978882" y="1483165"/>
-            <a:ext cx="0" cy="318426"/>
-          </a:xfrm>
-          <a:prstGeom prst="line">
-            <a:avLst/>
-          </a:prstGeom>
-          <a:ln w="19050">
-            <a:solidFill>
-              <a:schemeClr val="tx1"/>
-            </a:solidFill>
-            <a:prstDash val="solid"/>
-            <a:headEnd type="none" w="med" len="med"/>
-            <a:tailEnd type="arrow" w="med" len="med"/>
-          </a:ln>
-        </p:spPr>
-        <p:style>
-          <a:lnRef idx="1">
-            <a:schemeClr val="accent1"/>
-          </a:lnRef>
-          <a:fillRef idx="0">
-            <a:schemeClr val="accent1"/>
-          </a:fillRef>
-          <a:effectRef idx="0">
-            <a:schemeClr val="accent1"/>
-          </a:effectRef>
-          <a:fontRef idx="minor">
-            <a:schemeClr val="tx1"/>
-          </a:fontRef>
-        </p:style>
-      </p:cxnSp>
-      <p:sp>
-        <p:nvSpPr>
-          <p:cNvPr id="206" name="矩形 205">
-            <a:extLst>
-              <a:ext uri="{FF2B5EF4-FFF2-40B4-BE49-F238E27FC236}">
-                <a16:creationId xmlns:a16="http://schemas.microsoft.com/office/drawing/2014/main" id="{26DAB628-46BC-40C5-ABDB-62B346B7F82B}"/>
-              </a:ext>
-            </a:extLst>
-          </p:cNvPr>
-          <p:cNvSpPr/>
-          <p:nvPr/>
-        </p:nvSpPr>
-        <p:spPr>
-          <a:xfrm>
-            <a:off x="9152982" y="913046"/>
-            <a:ext cx="1651799" cy="584775"/>
-          </a:xfrm>
-          <a:prstGeom prst="rect">
-            <a:avLst/>
-          </a:prstGeom>
-        </p:spPr>
-        <p:txBody>
-          <a:bodyPr wrap="none">
-            <a:spAutoFit/>
-          </a:bodyPr>
-          <a:lstStyle/>
-          <a:p>
-            <a:pPr algn="ctr"/>
-            <a:r>
-              <a:rPr lang="en-US" altLang="zh-CN" sz="1600" i="1" dirty="0" err="1">
-                <a:latin typeface="Times New Roman" panose="02020603050405020304" pitchFamily="18" charset="0"/>
-                <a:cs typeface="Times New Roman" panose="02020603050405020304" pitchFamily="18" charset="0"/>
-              </a:rPr>
-              <a:t>synchronizeStates</a:t>
-            </a:r>
-            <a:endParaRPr lang="en-US" altLang="zh-CN" sz="1600" i="1" dirty="0">
-              <a:latin typeface="Times New Roman" panose="02020603050405020304" pitchFamily="18" charset="0"/>
-              <a:cs typeface="Times New Roman" panose="02020603050405020304" pitchFamily="18" charset="0"/>
-            </a:endParaRPr>
-          </a:p>
-          <a:p>
-            <a:pPr algn="ctr"/>
-            <a:r>
-              <a:rPr lang="en-US" altLang="zh-CN" sz="1600" dirty="0">
-                <a:solidFill>
-                  <a:schemeClr val="accent2"/>
-                </a:solidFill>
-                <a:latin typeface="Times New Roman" panose="02020603050405020304" pitchFamily="18" charset="0"/>
-                <a:cs typeface="Times New Roman" panose="02020603050405020304" pitchFamily="18" charset="0"/>
-              </a:rPr>
-              <a:t>(YAML)</a:t>
-            </a:r>
-            <a:endParaRPr lang="zh-CN" altLang="en-US" sz="1600" i="1" dirty="0">
               <a:solidFill>
                 <a:schemeClr val="accent2"/>
               </a:solidFill>

</xml_diff>